<commit_message>
wrap up presentation and code
</commit_message>
<xml_diff>
--- a/Introduction to ASP.NET MVC - Denver Dev Days/Introduction to ASP.NET MVC.pptx
+++ b/Introduction to ASP.NET MVC - Denver Dev Days/Introduction to ASP.NET MVC.pptx
@@ -5,10 +5,10 @@
     <p:sldMasterId id="2147483972" r:id="rId1"/>
   </p:sldMasterIdLst>
   <p:notesMasterIdLst>
-    <p:notesMasterId r:id="rId33"/>
+    <p:notesMasterId r:id="rId34"/>
   </p:notesMasterIdLst>
   <p:handoutMasterIdLst>
-    <p:handoutMasterId r:id="rId34"/>
+    <p:handoutMasterId r:id="rId35"/>
   </p:handoutMasterIdLst>
   <p:sldIdLst>
     <p:sldId id="256" r:id="rId2"/>
@@ -38,10 +38,11 @@
     <p:sldId id="286" r:id="rId26"/>
     <p:sldId id="287" r:id="rId27"/>
     <p:sldId id="288" r:id="rId28"/>
-    <p:sldId id="289" r:id="rId29"/>
-    <p:sldId id="264" r:id="rId30"/>
-    <p:sldId id="295" r:id="rId31"/>
-    <p:sldId id="258" r:id="rId32"/>
+    <p:sldId id="302" r:id="rId29"/>
+    <p:sldId id="289" r:id="rId30"/>
+    <p:sldId id="264" r:id="rId31"/>
+    <p:sldId id="295" r:id="rId32"/>
+    <p:sldId id="258" r:id="rId33"/>
   </p:sldIdLst>
   <p:sldSz cx="9144000" cy="6858000" type="screen4x3"/>
   <p:notesSz cx="6858000" cy="9144000"/>
@@ -1481,6 +1482,93 @@
               <a:rPr lang="en-US" smtClean="0"/>
               <a:pPr/>
               <a:t>28</a:t>
+            </a:fld>
+            <a:endParaRPr lang="en-US" dirty="0"/>
+          </a:p>
+        </p:txBody>
+      </p:sp>
+    </p:spTree>
+    <p:extLst>
+      <p:ext uri="{BB962C8B-B14F-4D97-AF65-F5344CB8AC3E}">
+        <p14:creationId xmlns:p14="http://schemas.microsoft.com/office/powerpoint/2010/main" val="2345806148"/>
+      </p:ext>
+    </p:extLst>
+  </p:cSld>
+  <p:clrMapOvr>
+    <a:masterClrMapping/>
+  </p:clrMapOvr>
+</p:notes>
+</file>
+
+<file path=ppt/notesSlides/notesSlide18.xml><?xml version="1.0" encoding="utf-8"?>
+<p:notes xmlns:a="http://schemas.openxmlformats.org/drawingml/2006/main" xmlns:r="http://schemas.openxmlformats.org/officeDocument/2006/relationships" xmlns:p="http://schemas.openxmlformats.org/presentationml/2006/main">
+  <p:cSld>
+    <p:spTree>
+      <p:nvGrpSpPr>
+        <p:cNvPr id="1" name=""/>
+        <p:cNvGrpSpPr/>
+        <p:nvPr/>
+      </p:nvGrpSpPr>
+      <p:grpSpPr>
+        <a:xfrm>
+          <a:off x="0" y="0"/>
+          <a:ext cx="0" cy="0"/>
+          <a:chOff x="0" y="0"/>
+          <a:chExt cx="0" cy="0"/>
+        </a:xfrm>
+      </p:grpSpPr>
+      <p:sp>
+        <p:nvSpPr>
+          <p:cNvPr id="2" name="Slide Image Placeholder 1"/>
+          <p:cNvSpPr>
+            <a:spLocks noGrp="1" noRot="1" noChangeAspect="1"/>
+          </p:cNvSpPr>
+          <p:nvPr>
+            <p:ph type="sldImg"/>
+          </p:nvPr>
+        </p:nvSpPr>
+        <p:spPr/>
+      </p:sp>
+      <p:sp>
+        <p:nvSpPr>
+          <p:cNvPr id="3" name="Notes Placeholder 2"/>
+          <p:cNvSpPr>
+            <a:spLocks noGrp="1"/>
+          </p:cNvSpPr>
+          <p:nvPr>
+            <p:ph type="body" idx="1"/>
+          </p:nvPr>
+        </p:nvSpPr>
+        <p:spPr/>
+        <p:txBody>
+          <a:bodyPr>
+            <a:normAutofit/>
+          </a:bodyPr>
+          <a:lstStyle/>
+          <a:p>
+            <a:endParaRPr lang="en-US" dirty="0"/>
+          </a:p>
+        </p:txBody>
+      </p:sp>
+      <p:sp>
+        <p:nvSpPr>
+          <p:cNvPr id="4" name="Slide Number Placeholder 3"/>
+          <p:cNvSpPr>
+            <a:spLocks noGrp="1"/>
+          </p:cNvSpPr>
+          <p:nvPr>
+            <p:ph type="sldNum" sz="quarter" idx="10"/>
+          </p:nvPr>
+        </p:nvSpPr>
+        <p:spPr/>
+        <p:txBody>
+          <a:bodyPr/>
+          <a:lstStyle/>
+          <a:p>
+            <a:fld id="{A53BD44F-18A8-46C3-8E60-05A8A5D6CFFD}" type="slidenum">
+              <a:rPr lang="en-US" smtClean="0"/>
+              <a:pPr/>
+              <a:t>29</a:t>
             </a:fld>
             <a:endParaRPr lang="en-US" dirty="0"/>
           </a:p>
@@ -5650,20 +5738,25 @@
             </a:r>
             <a:r>
               <a:rPr lang="en-US" sz="2400" dirty="0"/>
-              <a:t>@Model </a:t>
+              <a:t>@</a:t>
+            </a:r>
+            <a:r>
+              <a:rPr lang="en-US" sz="2400" dirty="0" err="1" smtClean="0"/>
+              <a:t>Model.Something</a:t>
             </a:r>
             <a:r>
               <a:rPr lang="en-US" sz="2400" dirty="0" smtClean="0"/>
-              <a:t>.something or @</a:t>
+              <a:t> </a:t>
+            </a:r>
+            <a:r>
+              <a:rPr lang="en-US" sz="2400" dirty="0" smtClean="0"/>
+              <a:t>or @</a:t>
             </a:r>
             <a:r>
               <a:rPr lang="en-US" sz="2400" dirty="0" err="1" smtClean="0"/>
-              <a:t>ViewBag</a:t>
-            </a:r>
-            <a:r>
-              <a:rPr lang="en-US" sz="2400" dirty="0" smtClean="0"/>
-              <a:t>&lt;something</a:t>
-            </a:r>
+              <a:t>ViewBag.Something</a:t>
+            </a:r>
+            <a:endParaRPr lang="en-US" sz="2400" dirty="0" smtClean="0"/>
           </a:p>
           <a:p>
             <a:endParaRPr lang="en-US" sz="2400" dirty="0" smtClean="0"/>
@@ -10983,7 +11076,15 @@
           <a:p>
             <a:r>
               <a:rPr lang="en-US" sz="2400" dirty="0" smtClean="0"/>
-              <a:t>Easier to navigate with JavaScript and jQuery</a:t>
+              <a:t>Easier to </a:t>
+            </a:r>
+            <a:r>
+              <a:rPr lang="en-US" sz="2400" dirty="0" smtClean="0"/>
+              <a:t>manipulate DOM with </a:t>
+            </a:r>
+            <a:r>
+              <a:rPr lang="en-US" sz="2400" dirty="0" smtClean="0"/>
+              <a:t>JavaScript and jQuery</a:t>
             </a:r>
           </a:p>
           <a:p>
@@ -10992,7 +11093,15 @@
           <a:p>
             <a:r>
               <a:rPr lang="en-US" sz="2400" dirty="0" smtClean="0"/>
-              <a:t>Easier to build Section 508 compliant sites</a:t>
+              <a:t>Easier to build </a:t>
+            </a:r>
+            <a:r>
+              <a:rPr lang="en-US" sz="2400" dirty="0" smtClean="0"/>
+              <a:t>accessible, Section </a:t>
+            </a:r>
+            <a:r>
+              <a:rPr lang="en-US" sz="2400" dirty="0" smtClean="0"/>
+              <a:t>508 compliant sites</a:t>
             </a:r>
           </a:p>
         </p:txBody>
@@ -12446,7 +12555,7 @@
 </file>
 
 <file path=ppt/slides/slide26.xml><?xml version="1.0" encoding="utf-8"?>
-<p:sld xmlns:a="http://schemas.openxmlformats.org/drawingml/2006/main" xmlns:r="http://schemas.openxmlformats.org/officeDocument/2006/relationships" xmlns:p="http://schemas.openxmlformats.org/presentationml/2006/main">
+<p:sld xmlns:a="http://schemas.openxmlformats.org/drawingml/2006/main" xmlns:r="http://schemas.openxmlformats.org/officeDocument/2006/relationships" xmlns:p="http://schemas.openxmlformats.org/presentationml/2006/main" show="0">
   <p:cSld>
     <p:spTree>
       <p:nvGrpSpPr>
@@ -12567,7 +12676,7 @@
 </file>
 
 <file path=ppt/slides/slide27.xml><?xml version="1.0" encoding="utf-8"?>
-<p:sld xmlns:a="http://schemas.openxmlformats.org/drawingml/2006/main" xmlns:r="http://schemas.openxmlformats.org/officeDocument/2006/relationships" xmlns:p="http://schemas.openxmlformats.org/presentationml/2006/main">
+<p:sld xmlns:a="http://schemas.openxmlformats.org/drawingml/2006/main" xmlns:r="http://schemas.openxmlformats.org/officeDocument/2006/relationships" xmlns:p="http://schemas.openxmlformats.org/presentationml/2006/main" show="0">
   <p:cSld>
     <p:spTree>
       <p:nvGrpSpPr>
@@ -13648,69 +13757,181 @@
                   <a:srgbClr val="0070C0"/>
                 </a:solidFill>
               </a:rPr>
-              <a:t>Headroom</a:t>
-            </a:r>
-          </a:p>
-          <a:p>
-            <a:endParaRPr lang="en-US" sz="2400" dirty="0" smtClean="0"/>
-          </a:p>
-          <a:p>
-            <a:r>
-              <a:rPr lang="en-US" sz="2400" dirty="0" smtClean="0"/>
-              <a:t>Extensible</a:t>
-            </a:r>
-          </a:p>
-          <a:p>
-            <a:pPr lvl="1"/>
-            <a:r>
-              <a:rPr lang="en-US" sz="2000" dirty="0" smtClean="0"/>
-              <a:t>Custom Routing</a:t>
-            </a:r>
-          </a:p>
-          <a:p>
-            <a:pPr lvl="1"/>
-            <a:r>
-              <a:rPr lang="en-US" sz="2000" dirty="0" smtClean="0"/>
-              <a:t>Custom View Engine</a:t>
-            </a:r>
-          </a:p>
-          <a:p>
-            <a:pPr lvl="1"/>
-            <a:r>
-              <a:rPr lang="en-US" sz="2000" dirty="0" smtClean="0"/>
-              <a:t>Custom Model/Parameter Binders</a:t>
-            </a:r>
-          </a:p>
-          <a:p>
-            <a:pPr lvl="1"/>
-            <a:r>
-              <a:rPr lang="en-US" sz="2000" dirty="0" smtClean="0"/>
-              <a:t>Custom Action Filters</a:t>
-            </a:r>
-          </a:p>
-          <a:p>
-            <a:pPr lvl="1"/>
-            <a:r>
-              <a:rPr lang="en-US" sz="2000" dirty="0" smtClean="0"/>
-              <a:t>Custom Formatters</a:t>
-            </a:r>
-          </a:p>
-          <a:p>
-            <a:pPr lvl="1"/>
-            <a:endParaRPr lang="en-US" sz="2000" dirty="0" smtClean="0"/>
-          </a:p>
-          <a:p>
-            <a:r>
-              <a:rPr lang="en-US" sz="2400" dirty="0" smtClean="0"/>
-              <a:t>All code is released as open source</a:t>
-            </a:r>
+              <a:t>Security</a:t>
+            </a:r>
+          </a:p>
+          <a:p>
+            <a:endParaRPr lang="en-US" dirty="0" smtClean="0"/>
+          </a:p>
+          <a:p>
+            <a:r>
+              <a:rPr lang="en-US" dirty="0" smtClean="0"/>
+              <a:t>Attributes on controller and/or action</a:t>
+            </a:r>
+          </a:p>
+          <a:p>
+            <a:endParaRPr lang="en-US" dirty="0"/>
+          </a:p>
+          <a:p>
+            <a:r>
+              <a:rPr lang="en-US" dirty="0" smtClean="0"/>
+              <a:t>Allow Anonymous is the default</a:t>
+            </a:r>
+          </a:p>
+          <a:p>
+            <a:pPr marL="0" indent="0">
+              <a:buNone/>
+            </a:pPr>
+            <a:endParaRPr lang="en-US" dirty="0" smtClean="0"/>
+          </a:p>
+          <a:p>
+            <a:pPr marL="0" indent="0">
+              <a:buNone/>
+            </a:pPr>
+            <a:endParaRPr lang="en-US" dirty="0" smtClean="0"/>
+          </a:p>
+        </p:txBody>
+      </p:sp>
+      <p:pic>
+        <p:nvPicPr>
+          <p:cNvPr id="4" name="Picture 3"/>
+          <p:cNvPicPr>
+            <a:picLocks noChangeAspect="1"/>
+          </p:cNvPicPr>
+          <p:nvPr/>
+        </p:nvPicPr>
+        <p:blipFill>
+          <a:blip r:embed="rId3"/>
+          <a:stretch>
+            <a:fillRect/>
+          </a:stretch>
+        </p:blipFill>
+        <p:spPr>
+          <a:xfrm>
+            <a:off x="628650" y="4001294"/>
+            <a:ext cx="5819048" cy="876190"/>
+          </a:xfrm>
+          <a:prstGeom prst="rect">
+            <a:avLst/>
+          </a:prstGeom>
+        </p:spPr>
+      </p:pic>
+      <p:pic>
+        <p:nvPicPr>
+          <p:cNvPr id="5" name="Picture 4"/>
+          <p:cNvPicPr>
+            <a:picLocks noChangeAspect="1"/>
+          </p:cNvPicPr>
+          <p:nvPr/>
+        </p:nvPicPr>
+        <p:blipFill>
+          <a:blip r:embed="rId4"/>
+          <a:stretch>
+            <a:fillRect/>
+          </a:stretch>
+        </p:blipFill>
+        <p:spPr>
+          <a:xfrm>
+            <a:off x="628650" y="5181600"/>
+            <a:ext cx="6409524" cy="885714"/>
+          </a:xfrm>
+          <a:prstGeom prst="rect">
+            <a:avLst/>
+          </a:prstGeom>
+        </p:spPr>
+      </p:pic>
+      <p:sp>
+        <p:nvSpPr>
+          <p:cNvPr id="6" name="Right Arrow 5"/>
+          <p:cNvSpPr/>
+          <p:nvPr/>
+        </p:nvSpPr>
+        <p:spPr>
+          <a:xfrm rot="10800000">
+            <a:off x="3360420" y="3970814"/>
+            <a:ext cx="406483" cy="381000"/>
+          </a:xfrm>
+          <a:prstGeom prst="rightArrow">
+            <a:avLst/>
+          </a:prstGeom>
+        </p:spPr>
+        <p:style>
+          <a:lnRef idx="2">
+            <a:schemeClr val="accent1">
+              <a:shade val="50000"/>
+            </a:schemeClr>
+          </a:lnRef>
+          <a:fillRef idx="1">
+            <a:schemeClr val="accent1"/>
+          </a:fillRef>
+          <a:effectRef idx="0">
+            <a:schemeClr val="accent1"/>
+          </a:effectRef>
+          <a:fontRef idx="minor">
+            <a:schemeClr val="lt1"/>
+          </a:fontRef>
+        </p:style>
+        <p:txBody>
+          <a:bodyPr rtlCol="0" anchor="ctr"/>
+          <a:lstStyle/>
+          <a:p>
+            <a:pPr algn="ctr"/>
+            <a:endParaRPr lang="en-US">
+              <a:solidFill>
+                <a:schemeClr val="tx1"/>
+              </a:solidFill>
+            </a:endParaRPr>
+          </a:p>
+        </p:txBody>
+      </p:sp>
+      <p:sp>
+        <p:nvSpPr>
+          <p:cNvPr id="7" name="Right Arrow 6"/>
+          <p:cNvSpPr/>
+          <p:nvPr/>
+        </p:nvSpPr>
+        <p:spPr>
+          <a:xfrm rot="10800000">
+            <a:off x="6654551" y="5143500"/>
+            <a:ext cx="406483" cy="381000"/>
+          </a:xfrm>
+          <a:prstGeom prst="rightArrow">
+            <a:avLst/>
+          </a:prstGeom>
+        </p:spPr>
+        <p:style>
+          <a:lnRef idx="2">
+            <a:schemeClr val="accent1">
+              <a:shade val="50000"/>
+            </a:schemeClr>
+          </a:lnRef>
+          <a:fillRef idx="1">
+            <a:schemeClr val="accent1"/>
+          </a:fillRef>
+          <a:effectRef idx="0">
+            <a:schemeClr val="accent1"/>
+          </a:effectRef>
+          <a:fontRef idx="minor">
+            <a:schemeClr val="lt1"/>
+          </a:fontRef>
+        </p:style>
+        <p:txBody>
+          <a:bodyPr rtlCol="0" anchor="ctr"/>
+          <a:lstStyle/>
+          <a:p>
+            <a:pPr algn="ctr"/>
+            <a:endParaRPr lang="en-US">
+              <a:solidFill>
+                <a:schemeClr val="tx1"/>
+              </a:solidFill>
+            </a:endParaRPr>
           </a:p>
         </p:txBody>
       </p:sp>
     </p:spTree>
     <p:extLst>
       <p:ext uri="{BB962C8B-B14F-4D97-AF65-F5344CB8AC3E}">
-        <p14:creationId xmlns:p14="http://schemas.microsoft.com/office/powerpoint/2010/main" val="573997567"/>
+        <p14:creationId xmlns:p14="http://schemas.microsoft.com/office/powerpoint/2010/main" val="4014255629"/>
       </p:ext>
     </p:extLst>
   </p:cSld>
@@ -13723,9 +13944,124 @@
   <p:timing>
     <p:tnLst>
       <p:par>
-        <p:cTn id="1" dur="indefinite" restart="never" nodeType="tmRoot"/>
+        <p:cTn id="1" dur="indefinite" restart="never" nodeType="tmRoot">
+          <p:childTnLst>
+            <p:seq concurrent="1" nextAc="seek">
+              <p:cTn id="2" dur="indefinite" nodeType="mainSeq">
+                <p:childTnLst>
+                  <p:par>
+                    <p:cTn id="3" fill="hold">
+                      <p:stCondLst>
+                        <p:cond delay="indefinite"/>
+                      </p:stCondLst>
+                      <p:childTnLst>
+                        <p:par>
+                          <p:cTn id="4" fill="hold">
+                            <p:stCondLst>
+                              <p:cond delay="0"/>
+                            </p:stCondLst>
+                            <p:childTnLst>
+                              <p:par>
+                                <p:cTn id="5" presetID="4" presetClass="entr" presetSubtype="16" fill="hold" grpId="0" nodeType="clickEffect">
+                                  <p:stCondLst>
+                                    <p:cond delay="0"/>
+                                  </p:stCondLst>
+                                  <p:childTnLst>
+                                    <p:set>
+                                      <p:cBhvr>
+                                        <p:cTn id="6" dur="1" fill="hold">
+                                          <p:stCondLst>
+                                            <p:cond delay="0"/>
+                                          </p:stCondLst>
+                                        </p:cTn>
+                                        <p:tgtEl>
+                                          <p:spTgt spid="6"/>
+                                        </p:tgtEl>
+                                        <p:attrNameLst>
+                                          <p:attrName>style.visibility</p:attrName>
+                                        </p:attrNameLst>
+                                      </p:cBhvr>
+                                      <p:to>
+                                        <p:strVal val="visible"/>
+                                      </p:to>
+                                    </p:set>
+                                    <p:animEffect transition="in" filter="box(in)">
+                                      <p:cBhvr>
+                                        <p:cTn id="7" dur="500"/>
+                                        <p:tgtEl>
+                                          <p:spTgt spid="6"/>
+                                        </p:tgtEl>
+                                      </p:cBhvr>
+                                    </p:animEffect>
+                                  </p:childTnLst>
+                                </p:cTn>
+                              </p:par>
+                              <p:par>
+                                <p:cTn id="8" presetID="4" presetClass="entr" presetSubtype="16" fill="hold" grpId="0" nodeType="withEffect">
+                                  <p:stCondLst>
+                                    <p:cond delay="0"/>
+                                  </p:stCondLst>
+                                  <p:childTnLst>
+                                    <p:set>
+                                      <p:cBhvr>
+                                        <p:cTn id="9" dur="1" fill="hold">
+                                          <p:stCondLst>
+                                            <p:cond delay="0"/>
+                                          </p:stCondLst>
+                                        </p:cTn>
+                                        <p:tgtEl>
+                                          <p:spTgt spid="7"/>
+                                        </p:tgtEl>
+                                        <p:attrNameLst>
+                                          <p:attrName>style.visibility</p:attrName>
+                                        </p:attrNameLst>
+                                      </p:cBhvr>
+                                      <p:to>
+                                        <p:strVal val="visible"/>
+                                      </p:to>
+                                    </p:set>
+                                    <p:animEffect transition="in" filter="box(in)">
+                                      <p:cBhvr>
+                                        <p:cTn id="10" dur="500"/>
+                                        <p:tgtEl>
+                                          <p:spTgt spid="7"/>
+                                        </p:tgtEl>
+                                      </p:cBhvr>
+                                    </p:animEffect>
+                                  </p:childTnLst>
+                                </p:cTn>
+                              </p:par>
+                            </p:childTnLst>
+                          </p:cTn>
+                        </p:par>
+                      </p:childTnLst>
+                    </p:cTn>
+                  </p:par>
+                </p:childTnLst>
+              </p:cTn>
+              <p:prevCondLst>
+                <p:cond evt="onPrev" delay="0">
+                  <p:tgtEl>
+                    <p:sldTgt/>
+                  </p:tgtEl>
+                </p:cond>
+              </p:prevCondLst>
+              <p:nextCondLst>
+                <p:cond evt="onNext" delay="0">
+                  <p:tgtEl>
+                    <p:sldTgt/>
+                  </p:tgtEl>
+                </p:cond>
+              </p:nextCondLst>
+            </p:seq>
+          </p:childTnLst>
+        </p:cTn>
       </p:par>
     </p:tnLst>
+    <p:bldLst>
+      <p:bldP spid="6" grpId="0" animBg="1"/>
+      <p:bldP spid="7" grpId="0" animBg="1"/>
+    </p:bldLst>
   </p:timing>
 </p:sld>
 </file>
@@ -13787,32 +14123,80 @@
           </a:bodyPr>
           <a:lstStyle/>
           <a:p>
+            <a:pPr marL="0" indent="0">
+              <a:buNone/>
+            </a:pPr>
+            <a:r>
+              <a:rPr lang="en-US" sz="2400" dirty="0" smtClean="0">
+                <a:solidFill>
+                  <a:srgbClr val="0070C0"/>
+                </a:solidFill>
+              </a:rPr>
+              <a:t>Headroom</a:t>
+            </a:r>
+          </a:p>
+          <a:p>
+            <a:endParaRPr lang="en-US" sz="2400" dirty="0" smtClean="0"/>
+          </a:p>
+          <a:p>
             <a:r>
               <a:rPr lang="en-US" sz="2400" dirty="0" smtClean="0"/>
-              <a:t>Part of ASP.NET, same security model</a:t>
-            </a:r>
-          </a:p>
-          <a:p>
-            <a:endParaRPr lang="en-US" sz="2400" dirty="0" smtClean="0"/>
+              <a:t>Extensible</a:t>
+            </a:r>
+          </a:p>
+          <a:p>
+            <a:pPr lvl="1"/>
+            <a:r>
+              <a:rPr lang="en-US" sz="2000" dirty="0" smtClean="0"/>
+              <a:t>Custom Routing</a:t>
+            </a:r>
+          </a:p>
+          <a:p>
+            <a:pPr lvl="1"/>
+            <a:r>
+              <a:rPr lang="en-US" sz="2000" dirty="0" smtClean="0"/>
+              <a:t>Custom View Engine</a:t>
+            </a:r>
+          </a:p>
+          <a:p>
+            <a:pPr lvl="1"/>
+            <a:r>
+              <a:rPr lang="en-US" sz="2000" dirty="0" smtClean="0"/>
+              <a:t>Custom Model/Parameter Binders</a:t>
+            </a:r>
+          </a:p>
+          <a:p>
+            <a:pPr lvl="1"/>
+            <a:r>
+              <a:rPr lang="en-US" sz="2000" dirty="0" smtClean="0"/>
+              <a:t>Custom Action Filters</a:t>
+            </a:r>
+          </a:p>
+          <a:p>
+            <a:pPr lvl="1"/>
+            <a:r>
+              <a:rPr lang="en-US" sz="2000" dirty="0" smtClean="0"/>
+              <a:t>Custom Formatters</a:t>
+            </a:r>
+          </a:p>
+          <a:p>
+            <a:pPr lvl="1"/>
+            <a:endParaRPr lang="en-US" sz="2000" dirty="0" smtClean="0"/>
           </a:p>
           <a:p>
             <a:r>
               <a:rPr lang="en-US" sz="2400" dirty="0" smtClean="0"/>
-              <a:t>Can run side-by-side with Web Forms, SignalR, etc.</a:t>
-            </a:r>
-          </a:p>
-          <a:p>
-            <a:endParaRPr lang="en-US" sz="2400" dirty="0" smtClean="0"/>
-          </a:p>
-          <a:p>
-            <a:r>
-              <a:rPr lang="en-US" sz="2400" dirty="0" smtClean="0"/>
-              <a:t>Cookies, Session, Caching, etc. still work the same</a:t>
+              <a:t>All code is released as open source</a:t>
             </a:r>
           </a:p>
         </p:txBody>
       </p:sp>
     </p:spTree>
+    <p:extLst>
+      <p:ext uri="{BB962C8B-B14F-4D97-AF65-F5344CB8AC3E}">
+        <p14:creationId xmlns:p14="http://schemas.microsoft.com/office/powerpoint/2010/main" val="573997567"/>
+      </p:ext>
+    </p:extLst>
   </p:cSld>
   <p:clrMapOvr>
     <a:masterClrMapping/>
@@ -14613,6 +14997,106 @@
       </p:grpSpPr>
       <p:sp>
         <p:nvSpPr>
+          <p:cNvPr id="2" name="Title 1"/>
+          <p:cNvSpPr>
+            <a:spLocks noGrp="1"/>
+          </p:cNvSpPr>
+          <p:nvPr>
+            <p:ph type="title"/>
+          </p:nvPr>
+        </p:nvSpPr>
+        <p:spPr/>
+        <p:txBody>
+          <a:bodyPr/>
+          <a:lstStyle/>
+          <a:p>
+            <a:r>
+              <a:rPr lang="en-US" sz="3200" dirty="0"/>
+              <a:t>MVC: The good parts</a:t>
+            </a:r>
+            <a:endParaRPr lang="en-US" dirty="0"/>
+          </a:p>
+        </p:txBody>
+      </p:sp>
+      <p:sp>
+        <p:nvSpPr>
+          <p:cNvPr id="3" name="Subtitle 2"/>
+          <p:cNvSpPr>
+            <a:spLocks noGrp="1"/>
+          </p:cNvSpPr>
+          <p:nvPr>
+            <p:ph idx="1"/>
+          </p:nvPr>
+        </p:nvSpPr>
+        <p:spPr/>
+        <p:txBody>
+          <a:bodyPr>
+            <a:normAutofit/>
+          </a:bodyPr>
+          <a:lstStyle/>
+          <a:p>
+            <a:r>
+              <a:rPr lang="en-US" sz="2400" dirty="0" smtClean="0"/>
+              <a:t>Part of ASP.NET, same security model</a:t>
+            </a:r>
+          </a:p>
+          <a:p>
+            <a:endParaRPr lang="en-US" sz="2400" dirty="0" smtClean="0"/>
+          </a:p>
+          <a:p>
+            <a:r>
+              <a:rPr lang="en-US" sz="2400" dirty="0" smtClean="0"/>
+              <a:t>Can run side-by-side with Web Forms, SignalR, etc.</a:t>
+            </a:r>
+          </a:p>
+          <a:p>
+            <a:endParaRPr lang="en-US" sz="2400" dirty="0" smtClean="0"/>
+          </a:p>
+          <a:p>
+            <a:r>
+              <a:rPr lang="en-US" sz="2400" dirty="0" smtClean="0"/>
+              <a:t>Cookies, Session, Caching, etc. still work the same</a:t>
+            </a:r>
+          </a:p>
+        </p:txBody>
+      </p:sp>
+    </p:spTree>
+  </p:cSld>
+  <p:clrMapOvr>
+    <a:masterClrMapping/>
+  </p:clrMapOvr>
+  <p:transition>
+    <p:fade/>
+  </p:transition>
+  <p:timing>
+    <p:tnLst>
+      <p:par>
+        <p:cTn id="1" dur="indefinite" restart="never" nodeType="tmRoot"/>
+      </p:par>
+    </p:tnLst>
+  </p:timing>
+</p:sld>
+</file>
+
+<file path=ppt/slides/slide31.xml><?xml version="1.0" encoding="utf-8"?>
+<p:sld xmlns:a="http://schemas.openxmlformats.org/drawingml/2006/main" xmlns:r="http://schemas.openxmlformats.org/officeDocument/2006/relationships" xmlns:p="http://schemas.openxmlformats.org/presentationml/2006/main">
+  <p:cSld>
+    <p:spTree>
+      <p:nvGrpSpPr>
+        <p:cNvPr id="1" name=""/>
+        <p:cNvGrpSpPr/>
+        <p:nvPr/>
+      </p:nvGrpSpPr>
+      <p:grpSpPr>
+        <a:xfrm>
+          <a:off x="0" y="0"/>
+          <a:ext cx="0" cy="0"/>
+          <a:chOff x="0" y="0"/>
+          <a:chExt cx="0" cy="0"/>
+        </a:xfrm>
+      </p:grpSpPr>
+      <p:sp>
+        <p:nvSpPr>
           <p:cNvPr id="3" name="Title 2"/>
           <p:cNvSpPr>
             <a:spLocks noGrp="1"/>
@@ -14706,7 +15190,7 @@
 </p:sld>
 </file>
 
-<file path=ppt/slides/slide31.xml><?xml version="1.0" encoding="utf-8"?>
+<file path=ppt/slides/slide32.xml><?xml version="1.0" encoding="utf-8"?>
 <p:sld xmlns:a="http://schemas.openxmlformats.org/drawingml/2006/main" xmlns:r="http://schemas.openxmlformats.org/officeDocument/2006/relationships" xmlns:p="http://schemas.openxmlformats.org/presentationml/2006/main">
   <p:cSld>
     <p:spTree>
@@ -20222,6 +20706,76 @@
                                   </p:childTnLst>
                                 </p:cTn>
                               </p:par>
+                              <p:par>
+                                <p:cTn id="14" presetID="10" presetClass="entr" presetSubtype="0" fill="hold" grpId="0" nodeType="withEffect">
+                                  <p:stCondLst>
+                                    <p:cond delay="0"/>
+                                  </p:stCondLst>
+                                  <p:childTnLst>
+                                    <p:set>
+                                      <p:cBhvr>
+                                        <p:cTn id="15" dur="1" fill="hold">
+                                          <p:stCondLst>
+                                            <p:cond delay="0"/>
+                                          </p:stCondLst>
+                                        </p:cTn>
+                                        <p:tgtEl>
+                                          <p:spTgt spid="22"/>
+                                        </p:tgtEl>
+                                        <p:attrNameLst>
+                                          <p:attrName>style.visibility</p:attrName>
+                                        </p:attrNameLst>
+                                      </p:cBhvr>
+                                      <p:to>
+                                        <p:strVal val="visible"/>
+                                      </p:to>
+                                    </p:set>
+                                    <p:animEffect transition="in" filter="fade">
+                                      <p:cBhvr>
+                                        <p:cTn id="16" dur="500"/>
+                                        <p:tgtEl>
+                                          <p:spTgt spid="22"/>
+                                        </p:tgtEl>
+                                      </p:cBhvr>
+                                    </p:animEffect>
+                                  </p:childTnLst>
+                                </p:cTn>
+                              </p:par>
+                              <p:par>
+                                <p:cTn id="17" presetID="10" presetClass="entr" presetSubtype="0" fill="hold" nodeType="withEffect">
+                                  <p:stCondLst>
+                                    <p:cond delay="0"/>
+                                  </p:stCondLst>
+                                  <p:childTnLst>
+                                    <p:set>
+                                      <p:cBhvr>
+                                        <p:cTn id="18" dur="1" fill="hold">
+                                          <p:stCondLst>
+                                            <p:cond delay="0"/>
+                                          </p:stCondLst>
+                                        </p:cTn>
+                                        <p:tgtEl>
+                                          <p:spTgt spid="24"/>
+                                        </p:tgtEl>
+                                        <p:attrNameLst>
+                                          <p:attrName>style.visibility</p:attrName>
+                                        </p:attrNameLst>
+                                      </p:cBhvr>
+                                      <p:to>
+                                        <p:strVal val="visible"/>
+                                      </p:to>
+                                    </p:set>
+                                    <p:animEffect transition="in" filter="fade">
+                                      <p:cBhvr>
+                                        <p:cTn id="19" dur="500"/>
+                                        <p:tgtEl>
+                                          <p:spTgt spid="24"/>
+                                        </p:tgtEl>
+                                      </p:cBhvr>
+                                    </p:animEffect>
+                                  </p:childTnLst>
+                                </p:cTn>
+                              </p:par>
                             </p:childTnLst>
                           </p:cTn>
                         </p:par>
@@ -20229,89 +20783,19 @@
                     </p:cTn>
                   </p:par>
                   <p:par>
-                    <p:cTn id="14" fill="hold">
+                    <p:cTn id="20" fill="hold">
                       <p:stCondLst>
                         <p:cond delay="indefinite"/>
                       </p:stCondLst>
                       <p:childTnLst>
                         <p:par>
-                          <p:cTn id="15" fill="hold">
+                          <p:cTn id="21" fill="hold">
                             <p:stCondLst>
                               <p:cond delay="0"/>
                             </p:stCondLst>
                             <p:childTnLst>
                               <p:par>
-                                <p:cTn id="16" presetID="10" presetClass="entr" presetSubtype="0" fill="hold" nodeType="clickEffect">
-                                  <p:stCondLst>
-                                    <p:cond delay="0"/>
-                                  </p:stCondLst>
-                                  <p:childTnLst>
-                                    <p:set>
-                                      <p:cBhvr>
-                                        <p:cTn id="17" dur="1" fill="hold">
-                                          <p:stCondLst>
-                                            <p:cond delay="0"/>
-                                          </p:stCondLst>
-                                        </p:cTn>
-                                        <p:tgtEl>
-                                          <p:spTgt spid="29"/>
-                                        </p:tgtEl>
-                                        <p:attrNameLst>
-                                          <p:attrName>style.visibility</p:attrName>
-                                        </p:attrNameLst>
-                                      </p:cBhvr>
-                                      <p:to>
-                                        <p:strVal val="visible"/>
-                                      </p:to>
-                                    </p:set>
-                                    <p:animEffect transition="in" filter="fade">
-                                      <p:cBhvr>
-                                        <p:cTn id="18" dur="500"/>
-                                        <p:tgtEl>
-                                          <p:spTgt spid="29"/>
-                                        </p:tgtEl>
-                                      </p:cBhvr>
-                                    </p:animEffect>
-                                  </p:childTnLst>
-                                </p:cTn>
-                              </p:par>
-                              <p:par>
-                                <p:cTn id="19" presetID="10" presetClass="entr" presetSubtype="0" fill="hold" grpId="0" nodeType="withEffect">
-                                  <p:stCondLst>
-                                    <p:cond delay="0"/>
-                                  </p:stCondLst>
-                                  <p:childTnLst>
-                                    <p:set>
-                                      <p:cBhvr>
-                                        <p:cTn id="20" dur="1" fill="hold">
-                                          <p:stCondLst>
-                                            <p:cond delay="0"/>
-                                          </p:stCondLst>
-                                        </p:cTn>
-                                        <p:tgtEl>
-                                          <p:spTgt spid="40"/>
-                                        </p:tgtEl>
-                                        <p:attrNameLst>
-                                          <p:attrName>style.visibility</p:attrName>
-                                        </p:attrNameLst>
-                                      </p:cBhvr>
-                                      <p:to>
-                                        <p:strVal val="visible"/>
-                                      </p:to>
-                                    </p:set>
-                                    <p:animEffect transition="in" filter="fade">
-                                      <p:cBhvr>
-                                        <p:cTn id="21" dur="500"/>
-                                        <p:tgtEl>
-                                          <p:spTgt spid="40"/>
-                                        </p:tgtEl>
-                                      </p:cBhvr>
-                                    </p:animEffect>
-                                  </p:childTnLst>
-                                </p:cTn>
-                              </p:par>
-                              <p:par>
-                                <p:cTn id="22" presetID="10" presetClass="entr" presetSubtype="0" fill="hold" grpId="0" nodeType="withEffect">
+                                <p:cTn id="22" presetID="10" presetClass="entr" presetSubtype="0" fill="hold" nodeType="clickEffect">
                                   <p:stCondLst>
                                     <p:cond delay="0"/>
                                   </p:stCondLst>
@@ -20324,7 +20808,7 @@
                                           </p:stCondLst>
                                         </p:cTn>
                                         <p:tgtEl>
-                                          <p:spTgt spid="37"/>
+                                          <p:spTgt spid="29"/>
                                         </p:tgtEl>
                                         <p:attrNameLst>
                                           <p:attrName>style.visibility</p:attrName>
@@ -20338,7 +20822,7 @@
                                       <p:cBhvr>
                                         <p:cTn id="24" dur="500"/>
                                         <p:tgtEl>
-                                          <p:spTgt spid="37"/>
+                                          <p:spTgt spid="29"/>
                                         </p:tgtEl>
                                       </p:cBhvr>
                                     </p:animEffect>
@@ -20359,7 +20843,7 @@
                                           </p:stCondLst>
                                         </p:cTn>
                                         <p:tgtEl>
-                                          <p:spTgt spid="22"/>
+                                          <p:spTgt spid="40"/>
                                         </p:tgtEl>
                                         <p:attrNameLst>
                                           <p:attrName>style.visibility</p:attrName>
@@ -20373,7 +20857,7 @@
                                       <p:cBhvr>
                                         <p:cTn id="27" dur="500"/>
                                         <p:tgtEl>
-                                          <p:spTgt spid="22"/>
+                                          <p:spTgt spid="40"/>
                                         </p:tgtEl>
                                       </p:cBhvr>
                                     </p:animEffect>
@@ -20381,7 +20865,7 @@
                                 </p:cTn>
                               </p:par>
                               <p:par>
-                                <p:cTn id="28" presetID="10" presetClass="entr" presetSubtype="0" fill="hold" nodeType="withEffect">
+                                <p:cTn id="28" presetID="10" presetClass="entr" presetSubtype="0" fill="hold" grpId="0" nodeType="withEffect">
                                   <p:stCondLst>
                                     <p:cond delay="0"/>
                                   </p:stCondLst>
@@ -20394,7 +20878,7 @@
                                           </p:stCondLst>
                                         </p:cTn>
                                         <p:tgtEl>
-                                          <p:spTgt spid="24"/>
+                                          <p:spTgt spid="37"/>
                                         </p:tgtEl>
                                         <p:attrNameLst>
                                           <p:attrName>style.visibility</p:attrName>
@@ -20408,7 +20892,77 @@
                                       <p:cBhvr>
                                         <p:cTn id="30" dur="500"/>
                                         <p:tgtEl>
-                                          <p:spTgt spid="24"/>
+                                          <p:spTgt spid="37"/>
+                                        </p:tgtEl>
+                                      </p:cBhvr>
+                                    </p:animEffect>
+                                  </p:childTnLst>
+                                </p:cTn>
+                              </p:par>
+                              <p:par>
+                                <p:cTn id="31" presetID="10" presetClass="entr" presetSubtype="0" fill="hold" nodeType="withEffect">
+                                  <p:stCondLst>
+                                    <p:cond delay="0"/>
+                                  </p:stCondLst>
+                                  <p:childTnLst>
+                                    <p:set>
+                                      <p:cBhvr>
+                                        <p:cTn id="32" dur="1" fill="hold">
+                                          <p:stCondLst>
+                                            <p:cond delay="0"/>
+                                          </p:stCondLst>
+                                        </p:cTn>
+                                        <p:tgtEl>
+                                          <p:spTgt spid="25"/>
+                                        </p:tgtEl>
+                                        <p:attrNameLst>
+                                          <p:attrName>style.visibility</p:attrName>
+                                        </p:attrNameLst>
+                                      </p:cBhvr>
+                                      <p:to>
+                                        <p:strVal val="visible"/>
+                                      </p:to>
+                                    </p:set>
+                                    <p:animEffect transition="in" filter="fade">
+                                      <p:cBhvr>
+                                        <p:cTn id="33" dur="500"/>
+                                        <p:tgtEl>
+                                          <p:spTgt spid="25"/>
+                                        </p:tgtEl>
+                                      </p:cBhvr>
+                                    </p:animEffect>
+                                  </p:childTnLst>
+                                </p:cTn>
+                              </p:par>
+                              <p:par>
+                                <p:cTn id="34" presetID="10" presetClass="entr" presetSubtype="0" fill="hold" grpId="0" nodeType="withEffect">
+                                  <p:stCondLst>
+                                    <p:cond delay="0"/>
+                                  </p:stCondLst>
+                                  <p:childTnLst>
+                                    <p:set>
+                                      <p:cBhvr>
+                                        <p:cTn id="35" dur="1" fill="hold">
+                                          <p:stCondLst>
+                                            <p:cond delay="0"/>
+                                          </p:stCondLst>
+                                        </p:cTn>
+                                        <p:tgtEl>
+                                          <p:spTgt spid="26"/>
+                                        </p:tgtEl>
+                                        <p:attrNameLst>
+                                          <p:attrName>style.visibility</p:attrName>
+                                        </p:attrNameLst>
+                                      </p:cBhvr>
+                                      <p:to>
+                                        <p:strVal val="visible"/>
+                                      </p:to>
+                                    </p:set>
+                                    <p:animEffect transition="in" filter="fade">
+                                      <p:cBhvr>
+                                        <p:cTn id="36" dur="500"/>
+                                        <p:tgtEl>
+                                          <p:spTgt spid="26"/>
                                         </p:tgtEl>
                                       </p:cBhvr>
                                     </p:animEffect>
@@ -20422,32 +20976,32 @@
                     </p:cTn>
                   </p:par>
                   <p:par>
-                    <p:cTn id="31" fill="hold">
+                    <p:cTn id="37" fill="hold">
                       <p:stCondLst>
                         <p:cond delay="indefinite"/>
                       </p:stCondLst>
                       <p:childTnLst>
                         <p:par>
-                          <p:cTn id="32" fill="hold">
+                          <p:cTn id="38" fill="hold">
                             <p:stCondLst>
                               <p:cond delay="0"/>
                             </p:stCondLst>
                             <p:childTnLst>
                               <p:par>
-                                <p:cTn id="33" presetID="10" presetClass="entr" presetSubtype="0" fill="hold" nodeType="clickEffect">
+                                <p:cTn id="39" presetID="10" presetClass="entr" presetSubtype="0" fill="hold" grpId="0" nodeType="clickEffect">
                                   <p:stCondLst>
                                     <p:cond delay="0"/>
                                   </p:stCondLst>
                                   <p:childTnLst>
                                     <p:set>
                                       <p:cBhvr>
-                                        <p:cTn id="34" dur="1" fill="hold">
+                                        <p:cTn id="40" dur="1" fill="hold">
                                           <p:stCondLst>
                                             <p:cond delay="0"/>
                                           </p:stCondLst>
                                         </p:cTn>
                                         <p:tgtEl>
-                                          <p:spTgt spid="25"/>
+                                          <p:spTgt spid="32"/>
                                         </p:tgtEl>
                                         <p:attrNameLst>
                                           <p:attrName>style.visibility</p:attrName>
@@ -20459,9 +21013,9 @@
                                     </p:set>
                                     <p:animEffect transition="in" filter="fade">
                                       <p:cBhvr>
-                                        <p:cTn id="35" dur="500"/>
-                                        <p:tgtEl>
-                                          <p:spTgt spid="25"/>
+                                        <p:cTn id="41" dur="500"/>
+                                        <p:tgtEl>
+                                          <p:spTgt spid="32"/>
                                         </p:tgtEl>
                                       </p:cBhvr>
                                     </p:animEffect>
@@ -20469,20 +21023,20 @@
                                 </p:cTn>
                               </p:par>
                               <p:par>
-                                <p:cTn id="36" presetID="10" presetClass="entr" presetSubtype="0" fill="hold" grpId="0" nodeType="withEffect">
+                                <p:cTn id="42" presetID="10" presetClass="entr" presetSubtype="0" fill="hold" grpId="0" nodeType="withEffect">
                                   <p:stCondLst>
                                     <p:cond delay="0"/>
                                   </p:stCondLst>
                                   <p:childTnLst>
                                     <p:set>
                                       <p:cBhvr>
-                                        <p:cTn id="37" dur="1" fill="hold">
+                                        <p:cTn id="43" dur="1" fill="hold">
                                           <p:stCondLst>
                                             <p:cond delay="0"/>
                                           </p:stCondLst>
                                         </p:cTn>
                                         <p:tgtEl>
-                                          <p:spTgt spid="26"/>
+                                          <p:spTgt spid="31"/>
                                         </p:tgtEl>
                                         <p:attrNameLst>
                                           <p:attrName>style.visibility</p:attrName>
@@ -20494,9 +21048,9 @@
                                     </p:set>
                                     <p:animEffect transition="in" filter="fade">
                                       <p:cBhvr>
-                                        <p:cTn id="38" dur="500"/>
-                                        <p:tgtEl>
-                                          <p:spTgt spid="26"/>
+                                        <p:cTn id="44" dur="500"/>
+                                        <p:tgtEl>
+                                          <p:spTgt spid="31"/>
                                         </p:tgtEl>
                                       </p:cBhvr>
                                     </p:animEffect>
@@ -20510,32 +21064,32 @@
                     </p:cTn>
                   </p:par>
                   <p:par>
-                    <p:cTn id="39" fill="hold">
+                    <p:cTn id="45" fill="hold">
                       <p:stCondLst>
                         <p:cond delay="indefinite"/>
                       </p:stCondLst>
                       <p:childTnLst>
                         <p:par>
-                          <p:cTn id="40" fill="hold">
+                          <p:cTn id="46" fill="hold">
                             <p:stCondLst>
                               <p:cond delay="0"/>
                             </p:stCondLst>
                             <p:childTnLst>
                               <p:par>
-                                <p:cTn id="41" presetID="10" presetClass="entr" presetSubtype="0" fill="hold" grpId="0" nodeType="clickEffect">
+                                <p:cTn id="47" presetID="10" presetClass="entr" presetSubtype="0" fill="hold" grpId="0" nodeType="clickEffect">
                                   <p:stCondLst>
                                     <p:cond delay="0"/>
                                   </p:stCondLst>
                                   <p:childTnLst>
                                     <p:set>
                                       <p:cBhvr>
-                                        <p:cTn id="42" dur="1" fill="hold">
+                                        <p:cTn id="48" dur="1" fill="hold">
                                           <p:stCondLst>
                                             <p:cond delay="0"/>
                                           </p:stCondLst>
                                         </p:cTn>
                                         <p:tgtEl>
-                                          <p:spTgt spid="32"/>
+                                          <p:spTgt spid="33"/>
                                         </p:tgtEl>
                                         <p:attrNameLst>
                                           <p:attrName>style.visibility</p:attrName>
@@ -20547,9 +21101,9 @@
                                     </p:set>
                                     <p:animEffect transition="in" filter="fade">
                                       <p:cBhvr>
-                                        <p:cTn id="43" dur="500"/>
-                                        <p:tgtEl>
-                                          <p:spTgt spid="32"/>
+                                        <p:cTn id="49" dur="500"/>
+                                        <p:tgtEl>
+                                          <p:spTgt spid="33"/>
                                         </p:tgtEl>
                                       </p:cBhvr>
                                     </p:animEffect>
@@ -20557,20 +21111,20 @@
                                 </p:cTn>
                               </p:par>
                               <p:par>
-                                <p:cTn id="44" presetID="10" presetClass="entr" presetSubtype="0" fill="hold" grpId="0" nodeType="withEffect">
+                                <p:cTn id="50" presetID="10" presetClass="entr" presetSubtype="0" fill="hold" grpId="0" nodeType="withEffect">
                                   <p:stCondLst>
                                     <p:cond delay="0"/>
                                   </p:stCondLst>
                                   <p:childTnLst>
                                     <p:set>
                                       <p:cBhvr>
-                                        <p:cTn id="45" dur="1" fill="hold">
+                                        <p:cTn id="51" dur="1" fill="hold">
                                           <p:stCondLst>
                                             <p:cond delay="0"/>
                                           </p:stCondLst>
                                         </p:cTn>
                                         <p:tgtEl>
-                                          <p:spTgt spid="31"/>
+                                          <p:spTgt spid="30"/>
                                         </p:tgtEl>
                                         <p:attrNameLst>
                                           <p:attrName>style.visibility</p:attrName>
@@ -20582,48 +21136,30 @@
                                     </p:set>
                                     <p:animEffect transition="in" filter="fade">
                                       <p:cBhvr>
-                                        <p:cTn id="46" dur="500"/>
-                                        <p:tgtEl>
-                                          <p:spTgt spid="31"/>
+                                        <p:cTn id="52" dur="500"/>
+                                        <p:tgtEl>
+                                          <p:spTgt spid="30"/>
                                         </p:tgtEl>
                                       </p:cBhvr>
                                     </p:animEffect>
                                   </p:childTnLst>
                                 </p:cTn>
                               </p:par>
-                            </p:childTnLst>
-                          </p:cTn>
-                        </p:par>
-                      </p:childTnLst>
-                    </p:cTn>
-                  </p:par>
-                  <p:par>
-                    <p:cTn id="47" fill="hold">
-                      <p:stCondLst>
-                        <p:cond delay="indefinite"/>
-                      </p:stCondLst>
-                      <p:childTnLst>
-                        <p:par>
-                          <p:cTn id="48" fill="hold">
-                            <p:stCondLst>
-                              <p:cond delay="0"/>
-                            </p:stCondLst>
-                            <p:childTnLst>
                               <p:par>
-                                <p:cTn id="49" presetID="10" presetClass="entr" presetSubtype="0" fill="hold" grpId="0" nodeType="clickEffect">
+                                <p:cTn id="53" presetID="10" presetClass="entr" presetSubtype="0" fill="hold" grpId="0" nodeType="withEffect">
                                   <p:stCondLst>
                                     <p:cond delay="0"/>
                                   </p:stCondLst>
                                   <p:childTnLst>
                                     <p:set>
                                       <p:cBhvr>
-                                        <p:cTn id="50" dur="1" fill="hold">
+                                        <p:cTn id="54" dur="1" fill="hold">
                                           <p:stCondLst>
                                             <p:cond delay="0"/>
                                           </p:stCondLst>
                                         </p:cTn>
                                         <p:tgtEl>
-                                          <p:spTgt spid="33"/>
+                                          <p:spTgt spid="28"/>
                                         </p:tgtEl>
                                         <p:attrNameLst>
                                           <p:attrName>style.visibility</p:attrName>
@@ -20635,9 +21171,9 @@
                                     </p:set>
                                     <p:animEffect transition="in" filter="fade">
                                       <p:cBhvr>
-                                        <p:cTn id="51" dur="500"/>
-                                        <p:tgtEl>
-                                          <p:spTgt spid="33"/>
+                                        <p:cTn id="55" dur="500"/>
+                                        <p:tgtEl>
+                                          <p:spTgt spid="28"/>
                                         </p:tgtEl>
                                       </p:cBhvr>
                                     </p:animEffect>
@@ -20645,20 +21181,20 @@
                                 </p:cTn>
                               </p:par>
                               <p:par>
-                                <p:cTn id="52" presetID="10" presetClass="entr" presetSubtype="0" fill="hold" grpId="0" nodeType="withEffect">
+                                <p:cTn id="56" presetID="10" presetClass="entr" presetSubtype="0" fill="hold" grpId="0" nodeType="withEffect">
                                   <p:stCondLst>
                                     <p:cond delay="0"/>
                                   </p:stCondLst>
                                   <p:childTnLst>
                                     <p:set>
                                       <p:cBhvr>
-                                        <p:cTn id="53" dur="1" fill="hold">
+                                        <p:cTn id="57" dur="1" fill="hold">
                                           <p:stCondLst>
                                             <p:cond delay="0"/>
                                           </p:stCondLst>
                                         </p:cTn>
                                         <p:tgtEl>
-                                          <p:spTgt spid="30"/>
+                                          <p:spTgt spid="27"/>
                                         </p:tgtEl>
                                         <p:attrNameLst>
                                           <p:attrName>style.visibility</p:attrName>
@@ -20670,77 +21206,7 @@
                                     </p:set>
                                     <p:animEffect transition="in" filter="fade">
                                       <p:cBhvr>
-                                        <p:cTn id="54" dur="500"/>
-                                        <p:tgtEl>
-                                          <p:spTgt spid="30"/>
-                                        </p:tgtEl>
-                                      </p:cBhvr>
-                                    </p:animEffect>
-                                  </p:childTnLst>
-                                </p:cTn>
-                              </p:par>
-                              <p:par>
-                                <p:cTn id="55" presetID="10" presetClass="entr" presetSubtype="0" fill="hold" grpId="0" nodeType="withEffect">
-                                  <p:stCondLst>
-                                    <p:cond delay="0"/>
-                                  </p:stCondLst>
-                                  <p:childTnLst>
-                                    <p:set>
-                                      <p:cBhvr>
-                                        <p:cTn id="56" dur="1" fill="hold">
-                                          <p:stCondLst>
-                                            <p:cond delay="0"/>
-                                          </p:stCondLst>
-                                        </p:cTn>
-                                        <p:tgtEl>
-                                          <p:spTgt spid="28"/>
-                                        </p:tgtEl>
-                                        <p:attrNameLst>
-                                          <p:attrName>style.visibility</p:attrName>
-                                        </p:attrNameLst>
-                                      </p:cBhvr>
-                                      <p:to>
-                                        <p:strVal val="visible"/>
-                                      </p:to>
-                                    </p:set>
-                                    <p:animEffect transition="in" filter="fade">
-                                      <p:cBhvr>
-                                        <p:cTn id="57" dur="500"/>
-                                        <p:tgtEl>
-                                          <p:spTgt spid="28"/>
-                                        </p:tgtEl>
-                                      </p:cBhvr>
-                                    </p:animEffect>
-                                  </p:childTnLst>
-                                </p:cTn>
-                              </p:par>
-                              <p:par>
-                                <p:cTn id="58" presetID="10" presetClass="entr" presetSubtype="0" fill="hold" grpId="0" nodeType="withEffect">
-                                  <p:stCondLst>
-                                    <p:cond delay="0"/>
-                                  </p:stCondLst>
-                                  <p:childTnLst>
-                                    <p:set>
-                                      <p:cBhvr>
-                                        <p:cTn id="59" dur="1" fill="hold">
-                                          <p:stCondLst>
-                                            <p:cond delay="0"/>
-                                          </p:stCondLst>
-                                        </p:cTn>
-                                        <p:tgtEl>
-                                          <p:spTgt spid="27"/>
-                                        </p:tgtEl>
-                                        <p:attrNameLst>
-                                          <p:attrName>style.visibility</p:attrName>
-                                        </p:attrNameLst>
-                                      </p:cBhvr>
-                                      <p:to>
-                                        <p:strVal val="visible"/>
-                                      </p:to>
-                                    </p:set>
-                                    <p:animEffect transition="in" filter="fade">
-                                      <p:cBhvr>
-                                        <p:cTn id="60" dur="500"/>
+                                        <p:cTn id="58" dur="500"/>
                                         <p:tgtEl>
                                           <p:spTgt spid="27"/>
                                         </p:tgtEl>

</xml_diff>

<commit_message>
moved slides, security demo
</commit_message>
<xml_diff>
--- a/Introduction to ASP.NET MVC - Denver Dev Days/Introduction to ASP.NET MVC.pptx
+++ b/Introduction to ASP.NET MVC - Denver Dev Days/Introduction to ASP.NET MVC.pptx
@@ -5,10 +5,10 @@
     <p:sldMasterId id="2147483972" r:id="rId1"/>
   </p:sldMasterIdLst>
   <p:notesMasterIdLst>
-    <p:notesMasterId r:id="rId34"/>
+    <p:notesMasterId r:id="rId35"/>
   </p:notesMasterIdLst>
   <p:handoutMasterIdLst>
-    <p:handoutMasterId r:id="rId35"/>
+    <p:handoutMasterId r:id="rId36"/>
   </p:handoutMasterIdLst>
   <p:sldIdLst>
     <p:sldId id="256" r:id="rId2"/>
@@ -31,18 +31,19 @@
     <p:sldId id="292" r:id="rId19"/>
     <p:sldId id="296" r:id="rId20"/>
     <p:sldId id="301" r:id="rId21"/>
-    <p:sldId id="262" r:id="rId22"/>
-    <p:sldId id="276" r:id="rId23"/>
-    <p:sldId id="277" r:id="rId24"/>
-    <p:sldId id="285" r:id="rId25"/>
-    <p:sldId id="286" r:id="rId26"/>
-    <p:sldId id="287" r:id="rId27"/>
-    <p:sldId id="288" r:id="rId28"/>
-    <p:sldId id="302" r:id="rId29"/>
-    <p:sldId id="289" r:id="rId30"/>
-    <p:sldId id="264" r:id="rId31"/>
-    <p:sldId id="295" r:id="rId32"/>
-    <p:sldId id="258" r:id="rId33"/>
+    <p:sldId id="302" r:id="rId22"/>
+    <p:sldId id="303" r:id="rId23"/>
+    <p:sldId id="262" r:id="rId24"/>
+    <p:sldId id="276" r:id="rId25"/>
+    <p:sldId id="277" r:id="rId26"/>
+    <p:sldId id="285" r:id="rId27"/>
+    <p:sldId id="286" r:id="rId28"/>
+    <p:sldId id="287" r:id="rId29"/>
+    <p:sldId id="288" r:id="rId30"/>
+    <p:sldId id="289" r:id="rId31"/>
+    <p:sldId id="264" r:id="rId32"/>
+    <p:sldId id="295" r:id="rId33"/>
+    <p:sldId id="258" r:id="rId34"/>
   </p:sldIdLst>
   <p:sldSz cx="9144000" cy="6858000" type="screen4x3"/>
   <p:notesSz cx="6858000" cy="9144000"/>
@@ -1133,7 +1134,7 @@
             <a:fld id="{A53BD44F-18A8-46C3-8E60-05A8A5D6CFFD}" type="slidenum">
               <a:rPr lang="en-US" smtClean="0"/>
               <a:pPr/>
-              <a:t>24</a:t>
+              <a:t>21</a:t>
             </a:fld>
             <a:endParaRPr lang="en-US" dirty="0"/>
           </a:p>
@@ -1142,7 +1143,7 @@
     </p:spTree>
     <p:extLst>
       <p:ext uri="{BB962C8B-B14F-4D97-AF65-F5344CB8AC3E}">
-        <p14:creationId xmlns:p14="http://schemas.microsoft.com/office/powerpoint/2010/main" val="278376522"/>
+        <p14:creationId xmlns:p14="http://schemas.microsoft.com/office/powerpoint/2010/main" val="2345806148"/>
       </p:ext>
     </p:extLst>
   </p:cSld>
@@ -1220,7 +1221,7 @@
             <a:fld id="{A53BD44F-18A8-46C3-8E60-05A8A5D6CFFD}" type="slidenum">
               <a:rPr lang="en-US" smtClean="0"/>
               <a:pPr/>
-              <a:t>25</a:t>
+              <a:t>26</a:t>
             </a:fld>
             <a:endParaRPr lang="en-US" dirty="0"/>
           </a:p>
@@ -1229,7 +1230,7 @@
     </p:spTree>
     <p:extLst>
       <p:ext uri="{BB962C8B-B14F-4D97-AF65-F5344CB8AC3E}">
-        <p14:creationId xmlns:p14="http://schemas.microsoft.com/office/powerpoint/2010/main" val="441779259"/>
+        <p14:creationId xmlns:p14="http://schemas.microsoft.com/office/powerpoint/2010/main" val="278376522"/>
       </p:ext>
     </p:extLst>
   </p:cSld>
@@ -1307,7 +1308,7 @@
             <a:fld id="{A53BD44F-18A8-46C3-8E60-05A8A5D6CFFD}" type="slidenum">
               <a:rPr lang="en-US" smtClean="0"/>
               <a:pPr/>
-              <a:t>26</a:t>
+              <a:t>27</a:t>
             </a:fld>
             <a:endParaRPr lang="en-US" dirty="0"/>
           </a:p>
@@ -1316,7 +1317,7 @@
     </p:spTree>
     <p:extLst>
       <p:ext uri="{BB962C8B-B14F-4D97-AF65-F5344CB8AC3E}">
-        <p14:creationId xmlns:p14="http://schemas.microsoft.com/office/powerpoint/2010/main" val="4106085742"/>
+        <p14:creationId xmlns:p14="http://schemas.microsoft.com/office/powerpoint/2010/main" val="441779259"/>
       </p:ext>
     </p:extLst>
   </p:cSld>
@@ -1394,7 +1395,7 @@
             <a:fld id="{A53BD44F-18A8-46C3-8E60-05A8A5D6CFFD}" type="slidenum">
               <a:rPr lang="en-US" smtClean="0"/>
               <a:pPr/>
-              <a:t>27</a:t>
+              <a:t>28</a:t>
             </a:fld>
             <a:endParaRPr lang="en-US" dirty="0"/>
           </a:p>
@@ -1403,7 +1404,7 @@
     </p:spTree>
     <p:extLst>
       <p:ext uri="{BB962C8B-B14F-4D97-AF65-F5344CB8AC3E}">
-        <p14:creationId xmlns:p14="http://schemas.microsoft.com/office/powerpoint/2010/main" val="769309100"/>
+        <p14:creationId xmlns:p14="http://schemas.microsoft.com/office/powerpoint/2010/main" val="4106085742"/>
       </p:ext>
     </p:extLst>
   </p:cSld>
@@ -1481,7 +1482,7 @@
             <a:fld id="{A53BD44F-18A8-46C3-8E60-05A8A5D6CFFD}" type="slidenum">
               <a:rPr lang="en-US" smtClean="0"/>
               <a:pPr/>
-              <a:t>28</a:t>
+              <a:t>29</a:t>
             </a:fld>
             <a:endParaRPr lang="en-US" dirty="0"/>
           </a:p>
@@ -1490,7 +1491,7 @@
     </p:spTree>
     <p:extLst>
       <p:ext uri="{BB962C8B-B14F-4D97-AF65-F5344CB8AC3E}">
-        <p14:creationId xmlns:p14="http://schemas.microsoft.com/office/powerpoint/2010/main" val="2345806148"/>
+        <p14:creationId xmlns:p14="http://schemas.microsoft.com/office/powerpoint/2010/main" val="769309100"/>
       </p:ext>
     </p:extLst>
   </p:cSld>
@@ -1568,7 +1569,7 @@
             <a:fld id="{A53BD44F-18A8-46C3-8E60-05A8A5D6CFFD}" type="slidenum">
               <a:rPr lang="en-US" smtClean="0"/>
               <a:pPr/>
-              <a:t>29</a:t>
+              <a:t>30</a:t>
             </a:fld>
             <a:endParaRPr lang="en-US" dirty="0"/>
           </a:p>
@@ -6182,6 +6183,9 @@
                     <p:cTn id="3" fill="hold">
                       <p:stCondLst>
                         <p:cond delay="indefinite"/>
+                        <p:cond evt="onBegin" delay="0">
+                          <p:tn val="2"/>
+                        </p:cond>
                       </p:stCondLst>
                       <p:childTnLst>
                         <p:par>
@@ -6191,7 +6195,7 @@
                             </p:stCondLst>
                             <p:childTnLst>
                               <p:par>
-                                <p:cTn id="5" presetID="4" presetClass="entr" presetSubtype="16" fill="hold" grpId="1" nodeType="clickEffect">
+                                <p:cTn id="5" presetID="4" presetClass="entr" presetSubtype="16" fill="hold" grpId="1" nodeType="afterEffect">
                                   <p:stCondLst>
                                     <p:cond delay="0"/>
                                   </p:stCondLst>
@@ -6928,6 +6932,9 @@
                     <p:cTn id="3" fill="hold">
                       <p:stCondLst>
                         <p:cond delay="indefinite"/>
+                        <p:cond evt="onBegin" delay="0">
+                          <p:tn val="2"/>
+                        </p:cond>
                       </p:stCondLst>
                       <p:childTnLst>
                         <p:par>
@@ -6937,7 +6944,7 @@
                             </p:stCondLst>
                             <p:childTnLst>
                               <p:par>
-                                <p:cTn id="5" presetID="4" presetClass="entr" presetSubtype="16" fill="hold" grpId="1" nodeType="clickEffect">
+                                <p:cTn id="5" presetID="4" presetClass="entr" presetSubtype="16" fill="hold" grpId="1" nodeType="withEffect">
                                   <p:stCondLst>
                                     <p:cond delay="0"/>
                                   </p:stCondLst>
@@ -7636,25 +7643,46 @@
             </a:r>
             <a:r>
               <a:rPr lang="en-US" dirty="0" smtClean="0"/>
-              <a:t>, which is a dynamic type</a:t>
-            </a:r>
-          </a:p>
-          <a:p>
+              <a:t>, which is a dynamic </a:t>
+            </a:r>
+            <a:r>
+              <a:rPr lang="en-US" dirty="0" smtClean="0"/>
+              <a:t>type</a:t>
+            </a:r>
+          </a:p>
+          <a:p>
+            <a:endParaRPr lang="en-US" dirty="0"/>
+          </a:p>
+          <a:p>
+            <a:r>
+              <a:rPr lang="en-US" dirty="0" smtClean="0"/>
+              <a:t>Can be </a:t>
+            </a:r>
+            <a:r>
+              <a:rPr lang="en-US" dirty="0" err="1" smtClean="0"/>
+              <a:t>TempData</a:t>
+            </a:r>
+            <a:r>
+              <a:rPr lang="en-US" dirty="0" smtClean="0"/>
+              <a:t>[“something”] for single-use values</a:t>
+            </a:r>
             <a:endParaRPr lang="en-US" dirty="0" smtClean="0"/>
           </a:p>
           <a:p>
+            <a:endParaRPr lang="en-US" dirty="0" smtClean="0"/>
+          </a:p>
+          <a:p>
             <a:r>
               <a:rPr lang="en-US" dirty="0" smtClean="0"/>
-              <a:t>Data to display in the View</a:t>
-            </a:r>
-          </a:p>
-          <a:p>
-            <a:endParaRPr lang="en-US" dirty="0" smtClean="0"/>
-          </a:p>
-          <a:p>
+              <a:t>Data to display in the </a:t>
+            </a:r>
             <a:r>
               <a:rPr lang="en-US" dirty="0" smtClean="0"/>
-              <a:t>Data posted from the View back to the Controller</a:t>
+              <a:t>View and data </a:t>
+            </a:r>
+            <a:r>
+              <a:rPr lang="en-US" dirty="0" smtClean="0"/>
+              <a:t>posted from the View back to the Controller</a:t>
             </a:r>
           </a:p>
           <a:p>
@@ -8017,6 +8045,9 @@
                     <p:cTn id="3" fill="hold">
                       <p:stCondLst>
                         <p:cond delay="indefinite"/>
+                        <p:cond evt="onBegin" delay="0">
+                          <p:tn val="2"/>
+                        </p:cond>
                       </p:stCondLst>
                       <p:childTnLst>
                         <p:par>
@@ -8026,7 +8057,7 @@
                             </p:stCondLst>
                             <p:childTnLst>
                               <p:par>
-                                <p:cTn id="5" presetID="4" presetClass="entr" presetSubtype="16" fill="hold" grpId="0" nodeType="clickEffect">
+                                <p:cTn id="5" presetID="4" presetClass="entr" presetSubtype="16" fill="hold" grpId="0" nodeType="withEffect">
                                   <p:stCondLst>
                                     <p:cond delay="0"/>
                                   </p:stCondLst>
@@ -8098,30 +8129,21 @@
                             </p:childTnLst>
                           </p:cTn>
                         </p:par>
-                      </p:childTnLst>
-                    </p:cTn>
-                  </p:par>
-                  <p:par>
-                    <p:cTn id="11" fill="hold">
-                      <p:stCondLst>
-                        <p:cond delay="indefinite"/>
-                      </p:stCondLst>
-                      <p:childTnLst>
                         <p:par>
-                          <p:cTn id="12" fill="hold">
+                          <p:cTn id="11" fill="hold">
                             <p:stCondLst>
-                              <p:cond delay="0"/>
+                              <p:cond delay="500"/>
                             </p:stCondLst>
                             <p:childTnLst>
                               <p:par>
-                                <p:cTn id="13" presetID="4" presetClass="entr" presetSubtype="16" fill="hold" grpId="0" nodeType="clickEffect">
+                                <p:cTn id="12" presetID="4" presetClass="entr" presetSubtype="16" fill="hold" grpId="0" nodeType="afterEffect">
                                   <p:stCondLst>
                                     <p:cond delay="0"/>
                                   </p:stCondLst>
                                   <p:childTnLst>
                                     <p:set>
                                       <p:cBhvr>
-                                        <p:cTn id="14" dur="1" fill="hold">
+                                        <p:cTn id="13" dur="1" fill="hold">
                                           <p:stCondLst>
                                             <p:cond delay="0"/>
                                           </p:stCondLst>
@@ -8139,7 +8161,7 @@
                                     </p:set>
                                     <p:animEffect transition="in" filter="box(in)">
                                       <p:cBhvr>
-                                        <p:cTn id="15" dur="500"/>
+                                        <p:cTn id="14" dur="500"/>
                                         <p:tgtEl>
                                           <p:spTgt spid="15"/>
                                         </p:tgtEl>
@@ -8149,14 +8171,14 @@
                                 </p:cTn>
                               </p:par>
                               <p:par>
-                                <p:cTn id="16" presetID="4" presetClass="entr" presetSubtype="16" fill="hold" grpId="0" nodeType="withEffect">
+                                <p:cTn id="15" presetID="4" presetClass="entr" presetSubtype="16" fill="hold" grpId="0" nodeType="withEffect">
                                   <p:stCondLst>
                                     <p:cond delay="0"/>
                                   </p:stCondLst>
                                   <p:childTnLst>
                                     <p:set>
                                       <p:cBhvr>
-                                        <p:cTn id="17" dur="1" fill="hold">
+                                        <p:cTn id="16" dur="1" fill="hold">
                                           <p:stCondLst>
                                             <p:cond delay="0"/>
                                           </p:stCondLst>
@@ -8174,7 +8196,7 @@
                                     </p:set>
                                     <p:animEffect transition="in" filter="box(in)">
                                       <p:cBhvr>
-                                        <p:cTn id="18" dur="500"/>
+                                        <p:cTn id="17" dur="500"/>
                                         <p:tgtEl>
                                           <p:spTgt spid="17"/>
                                         </p:tgtEl>
@@ -8979,6 +9001,468 @@
         </p:nvSpPr>
         <p:spPr/>
         <p:txBody>
+          <a:bodyPr/>
+          <a:lstStyle/>
+          <a:p>
+            <a:r>
+              <a:rPr lang="en-US" sz="3200" dirty="0"/>
+              <a:t>Basics of MVC – </a:t>
+            </a:r>
+            <a:r>
+              <a:rPr lang="en-US" sz="3200" dirty="0" smtClean="0"/>
+              <a:t>Security</a:t>
+            </a:r>
+            <a:endParaRPr lang="en-US" dirty="0"/>
+          </a:p>
+        </p:txBody>
+      </p:sp>
+      <p:sp>
+        <p:nvSpPr>
+          <p:cNvPr id="3" name="Subtitle 2"/>
+          <p:cNvSpPr>
+            <a:spLocks noGrp="1"/>
+          </p:cNvSpPr>
+          <p:nvPr>
+            <p:ph idx="1"/>
+          </p:nvPr>
+        </p:nvSpPr>
+        <p:spPr/>
+        <p:txBody>
+          <a:bodyPr>
+            <a:normAutofit/>
+          </a:bodyPr>
+          <a:lstStyle/>
+          <a:p>
+            <a:pPr marL="0" indent="0">
+              <a:buNone/>
+            </a:pPr>
+            <a:r>
+              <a:rPr lang="en-US" sz="2400" dirty="0" smtClean="0">
+                <a:solidFill>
+                  <a:srgbClr val="0070C0"/>
+                </a:solidFill>
+              </a:rPr>
+              <a:t>Security</a:t>
+            </a:r>
+          </a:p>
+          <a:p>
+            <a:endParaRPr lang="en-US" dirty="0" smtClean="0"/>
+          </a:p>
+          <a:p>
+            <a:r>
+              <a:rPr lang="en-US" dirty="0" smtClean="0"/>
+              <a:t>Attributes on controller and/or action</a:t>
+            </a:r>
+          </a:p>
+          <a:p>
+            <a:endParaRPr lang="en-US" dirty="0"/>
+          </a:p>
+          <a:p>
+            <a:r>
+              <a:rPr lang="en-US" dirty="0" smtClean="0"/>
+              <a:t>Allow Anonymous is the default</a:t>
+            </a:r>
+          </a:p>
+          <a:p>
+            <a:pPr marL="0" indent="0">
+              <a:buNone/>
+            </a:pPr>
+            <a:endParaRPr lang="en-US" dirty="0" smtClean="0"/>
+          </a:p>
+          <a:p>
+            <a:pPr marL="0" indent="0">
+              <a:buNone/>
+            </a:pPr>
+            <a:endParaRPr lang="en-US" dirty="0" smtClean="0"/>
+          </a:p>
+        </p:txBody>
+      </p:sp>
+      <p:pic>
+        <p:nvPicPr>
+          <p:cNvPr id="4" name="Picture 3"/>
+          <p:cNvPicPr>
+            <a:picLocks noChangeAspect="1"/>
+          </p:cNvPicPr>
+          <p:nvPr/>
+        </p:nvPicPr>
+        <p:blipFill>
+          <a:blip r:embed="rId3"/>
+          <a:stretch>
+            <a:fillRect/>
+          </a:stretch>
+        </p:blipFill>
+        <p:spPr>
+          <a:xfrm>
+            <a:off x="628650" y="4001294"/>
+            <a:ext cx="5819048" cy="876190"/>
+          </a:xfrm>
+          <a:prstGeom prst="rect">
+            <a:avLst/>
+          </a:prstGeom>
+        </p:spPr>
+      </p:pic>
+      <p:pic>
+        <p:nvPicPr>
+          <p:cNvPr id="5" name="Picture 4"/>
+          <p:cNvPicPr>
+            <a:picLocks noChangeAspect="1"/>
+          </p:cNvPicPr>
+          <p:nvPr/>
+        </p:nvPicPr>
+        <p:blipFill>
+          <a:blip r:embed="rId4"/>
+          <a:stretch>
+            <a:fillRect/>
+          </a:stretch>
+        </p:blipFill>
+        <p:spPr>
+          <a:xfrm>
+            <a:off x="628650" y="5181600"/>
+            <a:ext cx="6409524" cy="885714"/>
+          </a:xfrm>
+          <a:prstGeom prst="rect">
+            <a:avLst/>
+          </a:prstGeom>
+        </p:spPr>
+      </p:pic>
+      <p:sp>
+        <p:nvSpPr>
+          <p:cNvPr id="6" name="Right Arrow 5"/>
+          <p:cNvSpPr/>
+          <p:nvPr/>
+        </p:nvSpPr>
+        <p:spPr>
+          <a:xfrm rot="10800000">
+            <a:off x="3360420" y="3970814"/>
+            <a:ext cx="406483" cy="381000"/>
+          </a:xfrm>
+          <a:prstGeom prst="rightArrow">
+            <a:avLst/>
+          </a:prstGeom>
+        </p:spPr>
+        <p:style>
+          <a:lnRef idx="2">
+            <a:schemeClr val="accent1">
+              <a:shade val="50000"/>
+            </a:schemeClr>
+          </a:lnRef>
+          <a:fillRef idx="1">
+            <a:schemeClr val="accent1"/>
+          </a:fillRef>
+          <a:effectRef idx="0">
+            <a:schemeClr val="accent1"/>
+          </a:effectRef>
+          <a:fontRef idx="minor">
+            <a:schemeClr val="lt1"/>
+          </a:fontRef>
+        </p:style>
+        <p:txBody>
+          <a:bodyPr rtlCol="0" anchor="ctr"/>
+          <a:lstStyle/>
+          <a:p>
+            <a:pPr algn="ctr"/>
+            <a:endParaRPr lang="en-US">
+              <a:solidFill>
+                <a:schemeClr val="tx1"/>
+              </a:solidFill>
+            </a:endParaRPr>
+          </a:p>
+        </p:txBody>
+      </p:sp>
+      <p:sp>
+        <p:nvSpPr>
+          <p:cNvPr id="7" name="Right Arrow 6"/>
+          <p:cNvSpPr/>
+          <p:nvPr/>
+        </p:nvSpPr>
+        <p:spPr>
+          <a:xfrm rot="10800000">
+            <a:off x="6654551" y="5143500"/>
+            <a:ext cx="406483" cy="381000"/>
+          </a:xfrm>
+          <a:prstGeom prst="rightArrow">
+            <a:avLst/>
+          </a:prstGeom>
+        </p:spPr>
+        <p:style>
+          <a:lnRef idx="2">
+            <a:schemeClr val="accent1">
+              <a:shade val="50000"/>
+            </a:schemeClr>
+          </a:lnRef>
+          <a:fillRef idx="1">
+            <a:schemeClr val="accent1"/>
+          </a:fillRef>
+          <a:effectRef idx="0">
+            <a:schemeClr val="accent1"/>
+          </a:effectRef>
+          <a:fontRef idx="minor">
+            <a:schemeClr val="lt1"/>
+          </a:fontRef>
+        </p:style>
+        <p:txBody>
+          <a:bodyPr rtlCol="0" anchor="ctr"/>
+          <a:lstStyle/>
+          <a:p>
+            <a:pPr algn="ctr"/>
+            <a:endParaRPr lang="en-US">
+              <a:solidFill>
+                <a:schemeClr val="tx1"/>
+              </a:solidFill>
+            </a:endParaRPr>
+          </a:p>
+        </p:txBody>
+      </p:sp>
+    </p:spTree>
+    <p:extLst>
+      <p:ext uri="{BB962C8B-B14F-4D97-AF65-F5344CB8AC3E}">
+        <p14:creationId xmlns:p14="http://schemas.microsoft.com/office/powerpoint/2010/main" val="4014255629"/>
+      </p:ext>
+    </p:extLst>
+  </p:cSld>
+  <p:clrMapOvr>
+    <a:masterClrMapping/>
+  </p:clrMapOvr>
+  <p:transition>
+    <p:fade/>
+  </p:transition>
+  <p:timing>
+    <p:tnLst>
+      <p:par>
+        <p:cTn id="1" dur="indefinite" restart="never" nodeType="tmRoot">
+          <p:childTnLst>
+            <p:seq concurrent="1" nextAc="seek">
+              <p:cTn id="2" dur="indefinite" nodeType="mainSeq">
+                <p:childTnLst>
+                  <p:par>
+                    <p:cTn id="3" fill="hold">
+                      <p:stCondLst>
+                        <p:cond delay="indefinite"/>
+                        <p:cond evt="onBegin" delay="0">
+                          <p:tn val="2"/>
+                        </p:cond>
+                      </p:stCondLst>
+                      <p:childTnLst>
+                        <p:par>
+                          <p:cTn id="4" fill="hold">
+                            <p:stCondLst>
+                              <p:cond delay="0"/>
+                            </p:stCondLst>
+                            <p:childTnLst>
+                              <p:par>
+                                <p:cTn id="5" presetID="4" presetClass="entr" presetSubtype="16" fill="hold" grpId="0" nodeType="withEffect">
+                                  <p:stCondLst>
+                                    <p:cond delay="0"/>
+                                  </p:stCondLst>
+                                  <p:childTnLst>
+                                    <p:set>
+                                      <p:cBhvr>
+                                        <p:cTn id="6" dur="1" fill="hold">
+                                          <p:stCondLst>
+                                            <p:cond delay="0"/>
+                                          </p:stCondLst>
+                                        </p:cTn>
+                                        <p:tgtEl>
+                                          <p:spTgt spid="6"/>
+                                        </p:tgtEl>
+                                        <p:attrNameLst>
+                                          <p:attrName>style.visibility</p:attrName>
+                                        </p:attrNameLst>
+                                      </p:cBhvr>
+                                      <p:to>
+                                        <p:strVal val="visible"/>
+                                      </p:to>
+                                    </p:set>
+                                    <p:animEffect transition="in" filter="box(in)">
+                                      <p:cBhvr>
+                                        <p:cTn id="7" dur="500"/>
+                                        <p:tgtEl>
+                                          <p:spTgt spid="6"/>
+                                        </p:tgtEl>
+                                      </p:cBhvr>
+                                    </p:animEffect>
+                                  </p:childTnLst>
+                                </p:cTn>
+                              </p:par>
+                              <p:par>
+                                <p:cTn id="8" presetID="4" presetClass="entr" presetSubtype="16" fill="hold" grpId="0" nodeType="withEffect">
+                                  <p:stCondLst>
+                                    <p:cond delay="0"/>
+                                  </p:stCondLst>
+                                  <p:childTnLst>
+                                    <p:set>
+                                      <p:cBhvr>
+                                        <p:cTn id="9" dur="1" fill="hold">
+                                          <p:stCondLst>
+                                            <p:cond delay="0"/>
+                                          </p:stCondLst>
+                                        </p:cTn>
+                                        <p:tgtEl>
+                                          <p:spTgt spid="7"/>
+                                        </p:tgtEl>
+                                        <p:attrNameLst>
+                                          <p:attrName>style.visibility</p:attrName>
+                                        </p:attrNameLst>
+                                      </p:cBhvr>
+                                      <p:to>
+                                        <p:strVal val="visible"/>
+                                      </p:to>
+                                    </p:set>
+                                    <p:animEffect transition="in" filter="box(in)">
+                                      <p:cBhvr>
+                                        <p:cTn id="10" dur="500"/>
+                                        <p:tgtEl>
+                                          <p:spTgt spid="7"/>
+                                        </p:tgtEl>
+                                      </p:cBhvr>
+                                    </p:animEffect>
+                                  </p:childTnLst>
+                                </p:cTn>
+                              </p:par>
+                            </p:childTnLst>
+                          </p:cTn>
+                        </p:par>
+                      </p:childTnLst>
+                    </p:cTn>
+                  </p:par>
+                </p:childTnLst>
+              </p:cTn>
+              <p:prevCondLst>
+                <p:cond evt="onPrev" delay="0">
+                  <p:tgtEl>
+                    <p:sldTgt/>
+                  </p:tgtEl>
+                </p:cond>
+              </p:prevCondLst>
+              <p:nextCondLst>
+                <p:cond evt="onNext" delay="0">
+                  <p:tgtEl>
+                    <p:sldTgt/>
+                  </p:tgtEl>
+                </p:cond>
+              </p:nextCondLst>
+            </p:seq>
+          </p:childTnLst>
+        </p:cTn>
+      </p:par>
+    </p:tnLst>
+    <p:bldLst>
+      <p:bldP spid="6" grpId="0" animBg="1"/>
+      <p:bldP spid="7" grpId="0" animBg="1"/>
+    </p:bldLst>
+  </p:timing>
+</p:sld>
+</file>
+
+<file path=ppt/slides/slide22.xml><?xml version="1.0" encoding="utf-8"?>
+<p:sld xmlns:a="http://schemas.openxmlformats.org/drawingml/2006/main" xmlns:r="http://schemas.openxmlformats.org/officeDocument/2006/relationships" xmlns:p="http://schemas.openxmlformats.org/presentationml/2006/main">
+  <p:cSld>
+    <p:spTree>
+      <p:nvGrpSpPr>
+        <p:cNvPr id="1" name=""/>
+        <p:cNvGrpSpPr/>
+        <p:nvPr/>
+      </p:nvGrpSpPr>
+      <p:grpSpPr>
+        <a:xfrm>
+          <a:off x="0" y="0"/>
+          <a:ext cx="0" cy="0"/>
+          <a:chOff x="0" y="0"/>
+          <a:chExt cx="0" cy="0"/>
+        </a:xfrm>
+      </p:grpSpPr>
+      <p:sp>
+        <p:nvSpPr>
+          <p:cNvPr id="2" name="Title 1"/>
+          <p:cNvSpPr>
+            <a:spLocks noGrp="1"/>
+          </p:cNvSpPr>
+          <p:nvPr>
+            <p:ph type="title"/>
+          </p:nvPr>
+        </p:nvSpPr>
+        <p:spPr>
+          <a:xfrm>
+            <a:off x="685800" y="2743200"/>
+            <a:ext cx="7886700" cy="1325563"/>
+          </a:xfrm>
+          <a:ln>
+            <a:noFill/>
+          </a:ln>
+        </p:spPr>
+        <p:txBody>
+          <a:bodyPr>
+            <a:normAutofit/>
+          </a:bodyPr>
+          <a:lstStyle/>
+          <a:p>
+            <a:pPr algn="ctr"/>
+            <a:r>
+              <a:rPr lang="en-US" sz="4000" dirty="0" smtClean="0"/>
+              <a:t>Demo – </a:t>
+            </a:r>
+            <a:r>
+              <a:rPr lang="en-US" sz="4000" dirty="0" smtClean="0"/>
+              <a:t>Security</a:t>
+            </a:r>
+            <a:endParaRPr lang="en-US" sz="4000" dirty="0">
+              <a:latin typeface="Trebuchet MS" pitchFamily="34" charset="0"/>
+            </a:endParaRPr>
+          </a:p>
+        </p:txBody>
+      </p:sp>
+    </p:spTree>
+    <p:extLst>
+      <p:ext uri="{BB962C8B-B14F-4D97-AF65-F5344CB8AC3E}">
+        <p14:creationId xmlns:p14="http://schemas.microsoft.com/office/powerpoint/2010/main" val="2110179551"/>
+      </p:ext>
+    </p:extLst>
+  </p:cSld>
+  <p:clrMapOvr>
+    <a:masterClrMapping/>
+  </p:clrMapOvr>
+  <p:transition>
+    <p:fade/>
+  </p:transition>
+  <p:timing>
+    <p:tnLst>
+      <p:par>
+        <p:cTn id="1" dur="indefinite" restart="never" nodeType="tmRoot"/>
+      </p:par>
+    </p:tnLst>
+  </p:timing>
+</p:sld>
+</file>
+
+<file path=ppt/slides/slide23.xml><?xml version="1.0" encoding="utf-8"?>
+<p:sld xmlns:a="http://schemas.openxmlformats.org/drawingml/2006/main" xmlns:r="http://schemas.openxmlformats.org/officeDocument/2006/relationships" xmlns:p="http://schemas.openxmlformats.org/presentationml/2006/main">
+  <p:cSld>
+    <p:spTree>
+      <p:nvGrpSpPr>
+        <p:cNvPr id="1" name=""/>
+        <p:cNvGrpSpPr/>
+        <p:nvPr/>
+      </p:nvGrpSpPr>
+      <p:grpSpPr>
+        <a:xfrm>
+          <a:off x="0" y="0"/>
+          <a:ext cx="0" cy="0"/>
+          <a:chOff x="0" y="0"/>
+          <a:chExt cx="0" cy="0"/>
+        </a:xfrm>
+      </p:grpSpPr>
+      <p:sp>
+        <p:nvSpPr>
+          <p:cNvPr id="2" name="Title 1"/>
+          <p:cNvSpPr>
+            <a:spLocks noGrp="1"/>
+          </p:cNvSpPr>
+          <p:nvPr>
+            <p:ph type="title"/>
+          </p:nvPr>
+        </p:nvSpPr>
+        <p:spPr/>
+        <p:txBody>
           <a:bodyPr>
             <a:normAutofit/>
           </a:bodyPr>
@@ -9067,7 +9551,7 @@
 </p:sld>
 </file>
 
-<file path=ppt/slides/slide22.xml><?xml version="1.0" encoding="utf-8"?>
+<file path=ppt/slides/slide24.xml><?xml version="1.0" encoding="utf-8"?>
 <p:sld xmlns:a="http://schemas.openxmlformats.org/drawingml/2006/main" xmlns:r="http://schemas.openxmlformats.org/officeDocument/2006/relationships" xmlns:p="http://schemas.openxmlformats.org/presentationml/2006/main">
   <p:cSld>
     <p:spTree>
@@ -10859,7 +11343,7 @@
 </p:sld>
 </file>
 
-<file path=ppt/slides/slide23.xml><?xml version="1.0" encoding="utf-8"?>
+<file path=ppt/slides/slide25.xml><?xml version="1.0" encoding="utf-8"?>
 <p:sld xmlns:a="http://schemas.openxmlformats.org/drawingml/2006/main" xmlns:r="http://schemas.openxmlformats.org/officeDocument/2006/relationships" xmlns:p="http://schemas.openxmlformats.org/presentationml/2006/main">
   <p:cSld>
     <p:spTree>
@@ -10987,7 +11471,7 @@
 </p:sld>
 </file>
 
-<file path=ppt/slides/slide24.xml><?xml version="1.0" encoding="utf-8"?>
+<file path=ppt/slides/slide26.xml><?xml version="1.0" encoding="utf-8"?>
 <p:sld xmlns:a="http://schemas.openxmlformats.org/drawingml/2006/main" xmlns:r="http://schemas.openxmlformats.org/officeDocument/2006/relationships" xmlns:p="http://schemas.openxmlformats.org/presentationml/2006/main">
   <p:cSld>
     <p:spTree>
@@ -11129,7 +11613,7 @@
 </p:sld>
 </file>
 
-<file path=ppt/slides/slide25.xml><?xml version="1.0" encoding="utf-8"?>
+<file path=ppt/slides/slide27.xml><?xml version="1.0" encoding="utf-8"?>
 <p:sld xmlns:a="http://schemas.openxmlformats.org/drawingml/2006/main" xmlns:r="http://schemas.openxmlformats.org/officeDocument/2006/relationships" xmlns:p="http://schemas.openxmlformats.org/presentationml/2006/main">
   <p:cSld>
     <p:spTree>
@@ -12554,7 +13038,7 @@
 </p:sld>
 </file>
 
-<file path=ppt/slides/slide26.xml><?xml version="1.0" encoding="utf-8"?>
+<file path=ppt/slides/slide28.xml><?xml version="1.0" encoding="utf-8"?>
 <p:sld xmlns:a="http://schemas.openxmlformats.org/drawingml/2006/main" xmlns:r="http://schemas.openxmlformats.org/officeDocument/2006/relationships" xmlns:p="http://schemas.openxmlformats.org/presentationml/2006/main" show="0">
   <p:cSld>
     <p:spTree>
@@ -12675,7 +13159,7 @@
 </p:sld>
 </file>
 
-<file path=ppt/slides/slide27.xml><?xml version="1.0" encoding="utf-8"?>
+<file path=ppt/slides/slide29.xml><?xml version="1.0" encoding="utf-8"?>
 <p:sld xmlns:a="http://schemas.openxmlformats.org/drawingml/2006/main" xmlns:r="http://schemas.openxmlformats.org/officeDocument/2006/relationships" xmlns:p="http://schemas.openxmlformats.org/presentationml/2006/main" show="0">
   <p:cSld>
     <p:spTree>
@@ -13691,529 +14175,6 @@
 </p:sld>
 </file>
 
-<file path=ppt/slides/slide28.xml><?xml version="1.0" encoding="utf-8"?>
-<p:sld xmlns:a="http://schemas.openxmlformats.org/drawingml/2006/main" xmlns:r="http://schemas.openxmlformats.org/officeDocument/2006/relationships" xmlns:p="http://schemas.openxmlformats.org/presentationml/2006/main">
-  <p:cSld>
-    <p:spTree>
-      <p:nvGrpSpPr>
-        <p:cNvPr id="1" name=""/>
-        <p:cNvGrpSpPr/>
-        <p:nvPr/>
-      </p:nvGrpSpPr>
-      <p:grpSpPr>
-        <a:xfrm>
-          <a:off x="0" y="0"/>
-          <a:ext cx="0" cy="0"/>
-          <a:chOff x="0" y="0"/>
-          <a:chExt cx="0" cy="0"/>
-        </a:xfrm>
-      </p:grpSpPr>
-      <p:sp>
-        <p:nvSpPr>
-          <p:cNvPr id="2" name="Title 1"/>
-          <p:cNvSpPr>
-            <a:spLocks noGrp="1"/>
-          </p:cNvSpPr>
-          <p:nvPr>
-            <p:ph type="title"/>
-          </p:nvPr>
-        </p:nvSpPr>
-        <p:spPr/>
-        <p:txBody>
-          <a:bodyPr/>
-          <a:lstStyle/>
-          <a:p>
-            <a:r>
-              <a:rPr lang="en-US" sz="3200" dirty="0"/>
-              <a:t>MVC: The good parts</a:t>
-            </a:r>
-            <a:endParaRPr lang="en-US" dirty="0"/>
-          </a:p>
-        </p:txBody>
-      </p:sp>
-      <p:sp>
-        <p:nvSpPr>
-          <p:cNvPr id="3" name="Subtitle 2"/>
-          <p:cNvSpPr>
-            <a:spLocks noGrp="1"/>
-          </p:cNvSpPr>
-          <p:nvPr>
-            <p:ph idx="1"/>
-          </p:nvPr>
-        </p:nvSpPr>
-        <p:spPr/>
-        <p:txBody>
-          <a:bodyPr>
-            <a:normAutofit/>
-          </a:bodyPr>
-          <a:lstStyle/>
-          <a:p>
-            <a:pPr marL="0" indent="0">
-              <a:buNone/>
-            </a:pPr>
-            <a:r>
-              <a:rPr lang="en-US" sz="2400" dirty="0" smtClean="0">
-                <a:solidFill>
-                  <a:srgbClr val="0070C0"/>
-                </a:solidFill>
-              </a:rPr>
-              <a:t>Security</a:t>
-            </a:r>
-          </a:p>
-          <a:p>
-            <a:endParaRPr lang="en-US" dirty="0" smtClean="0"/>
-          </a:p>
-          <a:p>
-            <a:r>
-              <a:rPr lang="en-US" dirty="0" smtClean="0"/>
-              <a:t>Attributes on controller and/or action</a:t>
-            </a:r>
-          </a:p>
-          <a:p>
-            <a:endParaRPr lang="en-US" dirty="0"/>
-          </a:p>
-          <a:p>
-            <a:r>
-              <a:rPr lang="en-US" dirty="0" smtClean="0"/>
-              <a:t>Allow Anonymous is the default</a:t>
-            </a:r>
-          </a:p>
-          <a:p>
-            <a:pPr marL="0" indent="0">
-              <a:buNone/>
-            </a:pPr>
-            <a:endParaRPr lang="en-US" dirty="0" smtClean="0"/>
-          </a:p>
-          <a:p>
-            <a:pPr marL="0" indent="0">
-              <a:buNone/>
-            </a:pPr>
-            <a:endParaRPr lang="en-US" dirty="0" smtClean="0"/>
-          </a:p>
-        </p:txBody>
-      </p:sp>
-      <p:pic>
-        <p:nvPicPr>
-          <p:cNvPr id="4" name="Picture 3"/>
-          <p:cNvPicPr>
-            <a:picLocks noChangeAspect="1"/>
-          </p:cNvPicPr>
-          <p:nvPr/>
-        </p:nvPicPr>
-        <p:blipFill>
-          <a:blip r:embed="rId3"/>
-          <a:stretch>
-            <a:fillRect/>
-          </a:stretch>
-        </p:blipFill>
-        <p:spPr>
-          <a:xfrm>
-            <a:off x="628650" y="4001294"/>
-            <a:ext cx="5819048" cy="876190"/>
-          </a:xfrm>
-          <a:prstGeom prst="rect">
-            <a:avLst/>
-          </a:prstGeom>
-        </p:spPr>
-      </p:pic>
-      <p:pic>
-        <p:nvPicPr>
-          <p:cNvPr id="5" name="Picture 4"/>
-          <p:cNvPicPr>
-            <a:picLocks noChangeAspect="1"/>
-          </p:cNvPicPr>
-          <p:nvPr/>
-        </p:nvPicPr>
-        <p:blipFill>
-          <a:blip r:embed="rId4"/>
-          <a:stretch>
-            <a:fillRect/>
-          </a:stretch>
-        </p:blipFill>
-        <p:spPr>
-          <a:xfrm>
-            <a:off x="628650" y="5181600"/>
-            <a:ext cx="6409524" cy="885714"/>
-          </a:xfrm>
-          <a:prstGeom prst="rect">
-            <a:avLst/>
-          </a:prstGeom>
-        </p:spPr>
-      </p:pic>
-      <p:sp>
-        <p:nvSpPr>
-          <p:cNvPr id="6" name="Right Arrow 5"/>
-          <p:cNvSpPr/>
-          <p:nvPr/>
-        </p:nvSpPr>
-        <p:spPr>
-          <a:xfrm rot="10800000">
-            <a:off x="3360420" y="3970814"/>
-            <a:ext cx="406483" cy="381000"/>
-          </a:xfrm>
-          <a:prstGeom prst="rightArrow">
-            <a:avLst/>
-          </a:prstGeom>
-        </p:spPr>
-        <p:style>
-          <a:lnRef idx="2">
-            <a:schemeClr val="accent1">
-              <a:shade val="50000"/>
-            </a:schemeClr>
-          </a:lnRef>
-          <a:fillRef idx="1">
-            <a:schemeClr val="accent1"/>
-          </a:fillRef>
-          <a:effectRef idx="0">
-            <a:schemeClr val="accent1"/>
-          </a:effectRef>
-          <a:fontRef idx="minor">
-            <a:schemeClr val="lt1"/>
-          </a:fontRef>
-        </p:style>
-        <p:txBody>
-          <a:bodyPr rtlCol="0" anchor="ctr"/>
-          <a:lstStyle/>
-          <a:p>
-            <a:pPr algn="ctr"/>
-            <a:endParaRPr lang="en-US">
-              <a:solidFill>
-                <a:schemeClr val="tx1"/>
-              </a:solidFill>
-            </a:endParaRPr>
-          </a:p>
-        </p:txBody>
-      </p:sp>
-      <p:sp>
-        <p:nvSpPr>
-          <p:cNvPr id="7" name="Right Arrow 6"/>
-          <p:cNvSpPr/>
-          <p:nvPr/>
-        </p:nvSpPr>
-        <p:spPr>
-          <a:xfrm rot="10800000">
-            <a:off x="6654551" y="5143500"/>
-            <a:ext cx="406483" cy="381000"/>
-          </a:xfrm>
-          <a:prstGeom prst="rightArrow">
-            <a:avLst/>
-          </a:prstGeom>
-        </p:spPr>
-        <p:style>
-          <a:lnRef idx="2">
-            <a:schemeClr val="accent1">
-              <a:shade val="50000"/>
-            </a:schemeClr>
-          </a:lnRef>
-          <a:fillRef idx="1">
-            <a:schemeClr val="accent1"/>
-          </a:fillRef>
-          <a:effectRef idx="0">
-            <a:schemeClr val="accent1"/>
-          </a:effectRef>
-          <a:fontRef idx="minor">
-            <a:schemeClr val="lt1"/>
-          </a:fontRef>
-        </p:style>
-        <p:txBody>
-          <a:bodyPr rtlCol="0" anchor="ctr"/>
-          <a:lstStyle/>
-          <a:p>
-            <a:pPr algn="ctr"/>
-            <a:endParaRPr lang="en-US">
-              <a:solidFill>
-                <a:schemeClr val="tx1"/>
-              </a:solidFill>
-            </a:endParaRPr>
-          </a:p>
-        </p:txBody>
-      </p:sp>
-    </p:spTree>
-    <p:extLst>
-      <p:ext uri="{BB962C8B-B14F-4D97-AF65-F5344CB8AC3E}">
-        <p14:creationId xmlns:p14="http://schemas.microsoft.com/office/powerpoint/2010/main" val="4014255629"/>
-      </p:ext>
-    </p:extLst>
-  </p:cSld>
-  <p:clrMapOvr>
-    <a:masterClrMapping/>
-  </p:clrMapOvr>
-  <p:transition>
-    <p:fade/>
-  </p:transition>
-  <p:timing>
-    <p:tnLst>
-      <p:par>
-        <p:cTn id="1" dur="indefinite" restart="never" nodeType="tmRoot">
-          <p:childTnLst>
-            <p:seq concurrent="1" nextAc="seek">
-              <p:cTn id="2" dur="indefinite" nodeType="mainSeq">
-                <p:childTnLst>
-                  <p:par>
-                    <p:cTn id="3" fill="hold">
-                      <p:stCondLst>
-                        <p:cond delay="indefinite"/>
-                      </p:stCondLst>
-                      <p:childTnLst>
-                        <p:par>
-                          <p:cTn id="4" fill="hold">
-                            <p:stCondLst>
-                              <p:cond delay="0"/>
-                            </p:stCondLst>
-                            <p:childTnLst>
-                              <p:par>
-                                <p:cTn id="5" presetID="4" presetClass="entr" presetSubtype="16" fill="hold" grpId="0" nodeType="clickEffect">
-                                  <p:stCondLst>
-                                    <p:cond delay="0"/>
-                                  </p:stCondLst>
-                                  <p:childTnLst>
-                                    <p:set>
-                                      <p:cBhvr>
-                                        <p:cTn id="6" dur="1" fill="hold">
-                                          <p:stCondLst>
-                                            <p:cond delay="0"/>
-                                          </p:stCondLst>
-                                        </p:cTn>
-                                        <p:tgtEl>
-                                          <p:spTgt spid="6"/>
-                                        </p:tgtEl>
-                                        <p:attrNameLst>
-                                          <p:attrName>style.visibility</p:attrName>
-                                        </p:attrNameLst>
-                                      </p:cBhvr>
-                                      <p:to>
-                                        <p:strVal val="visible"/>
-                                      </p:to>
-                                    </p:set>
-                                    <p:animEffect transition="in" filter="box(in)">
-                                      <p:cBhvr>
-                                        <p:cTn id="7" dur="500"/>
-                                        <p:tgtEl>
-                                          <p:spTgt spid="6"/>
-                                        </p:tgtEl>
-                                      </p:cBhvr>
-                                    </p:animEffect>
-                                  </p:childTnLst>
-                                </p:cTn>
-                              </p:par>
-                              <p:par>
-                                <p:cTn id="8" presetID="4" presetClass="entr" presetSubtype="16" fill="hold" grpId="0" nodeType="withEffect">
-                                  <p:stCondLst>
-                                    <p:cond delay="0"/>
-                                  </p:stCondLst>
-                                  <p:childTnLst>
-                                    <p:set>
-                                      <p:cBhvr>
-                                        <p:cTn id="9" dur="1" fill="hold">
-                                          <p:stCondLst>
-                                            <p:cond delay="0"/>
-                                          </p:stCondLst>
-                                        </p:cTn>
-                                        <p:tgtEl>
-                                          <p:spTgt spid="7"/>
-                                        </p:tgtEl>
-                                        <p:attrNameLst>
-                                          <p:attrName>style.visibility</p:attrName>
-                                        </p:attrNameLst>
-                                      </p:cBhvr>
-                                      <p:to>
-                                        <p:strVal val="visible"/>
-                                      </p:to>
-                                    </p:set>
-                                    <p:animEffect transition="in" filter="box(in)">
-                                      <p:cBhvr>
-                                        <p:cTn id="10" dur="500"/>
-                                        <p:tgtEl>
-                                          <p:spTgt spid="7"/>
-                                        </p:tgtEl>
-                                      </p:cBhvr>
-                                    </p:animEffect>
-                                  </p:childTnLst>
-                                </p:cTn>
-                              </p:par>
-                            </p:childTnLst>
-                          </p:cTn>
-                        </p:par>
-                      </p:childTnLst>
-                    </p:cTn>
-                  </p:par>
-                </p:childTnLst>
-              </p:cTn>
-              <p:prevCondLst>
-                <p:cond evt="onPrev" delay="0">
-                  <p:tgtEl>
-                    <p:sldTgt/>
-                  </p:tgtEl>
-                </p:cond>
-              </p:prevCondLst>
-              <p:nextCondLst>
-                <p:cond evt="onNext" delay="0">
-                  <p:tgtEl>
-                    <p:sldTgt/>
-                  </p:tgtEl>
-                </p:cond>
-              </p:nextCondLst>
-            </p:seq>
-          </p:childTnLst>
-        </p:cTn>
-      </p:par>
-    </p:tnLst>
-    <p:bldLst>
-      <p:bldP spid="6" grpId="0" animBg="1"/>
-      <p:bldP spid="7" grpId="0" animBg="1"/>
-    </p:bldLst>
-  </p:timing>
-</p:sld>
-</file>
-
-<file path=ppt/slides/slide29.xml><?xml version="1.0" encoding="utf-8"?>
-<p:sld xmlns:a="http://schemas.openxmlformats.org/drawingml/2006/main" xmlns:r="http://schemas.openxmlformats.org/officeDocument/2006/relationships" xmlns:p="http://schemas.openxmlformats.org/presentationml/2006/main">
-  <p:cSld>
-    <p:spTree>
-      <p:nvGrpSpPr>
-        <p:cNvPr id="1" name=""/>
-        <p:cNvGrpSpPr/>
-        <p:nvPr/>
-      </p:nvGrpSpPr>
-      <p:grpSpPr>
-        <a:xfrm>
-          <a:off x="0" y="0"/>
-          <a:ext cx="0" cy="0"/>
-          <a:chOff x="0" y="0"/>
-          <a:chExt cx="0" cy="0"/>
-        </a:xfrm>
-      </p:grpSpPr>
-      <p:sp>
-        <p:nvSpPr>
-          <p:cNvPr id="2" name="Title 1"/>
-          <p:cNvSpPr>
-            <a:spLocks noGrp="1"/>
-          </p:cNvSpPr>
-          <p:nvPr>
-            <p:ph type="title"/>
-          </p:nvPr>
-        </p:nvSpPr>
-        <p:spPr/>
-        <p:txBody>
-          <a:bodyPr/>
-          <a:lstStyle/>
-          <a:p>
-            <a:r>
-              <a:rPr lang="en-US" sz="3200" dirty="0"/>
-              <a:t>MVC: The good parts</a:t>
-            </a:r>
-            <a:endParaRPr lang="en-US" dirty="0"/>
-          </a:p>
-        </p:txBody>
-      </p:sp>
-      <p:sp>
-        <p:nvSpPr>
-          <p:cNvPr id="3" name="Subtitle 2"/>
-          <p:cNvSpPr>
-            <a:spLocks noGrp="1"/>
-          </p:cNvSpPr>
-          <p:nvPr>
-            <p:ph idx="1"/>
-          </p:nvPr>
-        </p:nvSpPr>
-        <p:spPr/>
-        <p:txBody>
-          <a:bodyPr>
-            <a:normAutofit/>
-          </a:bodyPr>
-          <a:lstStyle/>
-          <a:p>
-            <a:pPr marL="0" indent="0">
-              <a:buNone/>
-            </a:pPr>
-            <a:r>
-              <a:rPr lang="en-US" sz="2400" dirty="0" smtClean="0">
-                <a:solidFill>
-                  <a:srgbClr val="0070C0"/>
-                </a:solidFill>
-              </a:rPr>
-              <a:t>Headroom</a:t>
-            </a:r>
-          </a:p>
-          <a:p>
-            <a:endParaRPr lang="en-US" sz="2400" dirty="0" smtClean="0"/>
-          </a:p>
-          <a:p>
-            <a:r>
-              <a:rPr lang="en-US" sz="2400" dirty="0" smtClean="0"/>
-              <a:t>Extensible</a:t>
-            </a:r>
-          </a:p>
-          <a:p>
-            <a:pPr lvl="1"/>
-            <a:r>
-              <a:rPr lang="en-US" sz="2000" dirty="0" smtClean="0"/>
-              <a:t>Custom Routing</a:t>
-            </a:r>
-          </a:p>
-          <a:p>
-            <a:pPr lvl="1"/>
-            <a:r>
-              <a:rPr lang="en-US" sz="2000" dirty="0" smtClean="0"/>
-              <a:t>Custom View Engine</a:t>
-            </a:r>
-          </a:p>
-          <a:p>
-            <a:pPr lvl="1"/>
-            <a:r>
-              <a:rPr lang="en-US" sz="2000" dirty="0" smtClean="0"/>
-              <a:t>Custom Model/Parameter Binders</a:t>
-            </a:r>
-          </a:p>
-          <a:p>
-            <a:pPr lvl="1"/>
-            <a:r>
-              <a:rPr lang="en-US" sz="2000" dirty="0" smtClean="0"/>
-              <a:t>Custom Action Filters</a:t>
-            </a:r>
-          </a:p>
-          <a:p>
-            <a:pPr lvl="1"/>
-            <a:r>
-              <a:rPr lang="en-US" sz="2000" dirty="0" smtClean="0"/>
-              <a:t>Custom Formatters</a:t>
-            </a:r>
-          </a:p>
-          <a:p>
-            <a:pPr lvl="1"/>
-            <a:endParaRPr lang="en-US" sz="2000" dirty="0" smtClean="0"/>
-          </a:p>
-          <a:p>
-            <a:r>
-              <a:rPr lang="en-US" sz="2400" dirty="0" smtClean="0"/>
-              <a:t>All code is released as open source</a:t>
-            </a:r>
-          </a:p>
-        </p:txBody>
-      </p:sp>
-    </p:spTree>
-    <p:extLst>
-      <p:ext uri="{BB962C8B-B14F-4D97-AF65-F5344CB8AC3E}">
-        <p14:creationId xmlns:p14="http://schemas.microsoft.com/office/powerpoint/2010/main" val="573997567"/>
-      </p:ext>
-    </p:extLst>
-  </p:cSld>
-  <p:clrMapOvr>
-    <a:masterClrMapping/>
-  </p:clrMapOvr>
-  <p:transition>
-    <p:fade/>
-  </p:transition>
-  <p:timing>
-    <p:tnLst>
-      <p:par>
-        <p:cTn id="1" dur="indefinite" restart="never" nodeType="tmRoot"/>
-      </p:par>
-    </p:tnLst>
-  </p:timing>
-</p:sld>
-</file>
-
 <file path=ppt/slides/slide3.xml><?xml version="1.0" encoding="utf-8"?>
 <p:sld xmlns:a="http://schemas.openxmlformats.org/drawingml/2006/main" xmlns:r="http://schemas.openxmlformats.org/officeDocument/2006/relationships" xmlns:p="http://schemas.openxmlformats.org/presentationml/2006/main">
   <p:cSld>
@@ -15035,32 +14996,80 @@
           </a:bodyPr>
           <a:lstStyle/>
           <a:p>
+            <a:pPr marL="0" indent="0">
+              <a:buNone/>
+            </a:pPr>
+            <a:r>
+              <a:rPr lang="en-US" sz="2400" dirty="0" smtClean="0">
+                <a:solidFill>
+                  <a:srgbClr val="0070C0"/>
+                </a:solidFill>
+              </a:rPr>
+              <a:t>Headroom</a:t>
+            </a:r>
+          </a:p>
+          <a:p>
+            <a:endParaRPr lang="en-US" sz="2400" dirty="0" smtClean="0"/>
+          </a:p>
+          <a:p>
             <a:r>
               <a:rPr lang="en-US" sz="2400" dirty="0" smtClean="0"/>
-              <a:t>Part of ASP.NET, same security model</a:t>
-            </a:r>
-          </a:p>
-          <a:p>
-            <a:endParaRPr lang="en-US" sz="2400" dirty="0" smtClean="0"/>
+              <a:t>Extensible</a:t>
+            </a:r>
+          </a:p>
+          <a:p>
+            <a:pPr lvl="1"/>
+            <a:r>
+              <a:rPr lang="en-US" sz="2000" dirty="0" smtClean="0"/>
+              <a:t>Custom Routing</a:t>
+            </a:r>
+          </a:p>
+          <a:p>
+            <a:pPr lvl="1"/>
+            <a:r>
+              <a:rPr lang="en-US" sz="2000" dirty="0" smtClean="0"/>
+              <a:t>Custom View Engine</a:t>
+            </a:r>
+          </a:p>
+          <a:p>
+            <a:pPr lvl="1"/>
+            <a:r>
+              <a:rPr lang="en-US" sz="2000" dirty="0" smtClean="0"/>
+              <a:t>Custom Model/Parameter Binders</a:t>
+            </a:r>
+          </a:p>
+          <a:p>
+            <a:pPr lvl="1"/>
+            <a:r>
+              <a:rPr lang="en-US" sz="2000" dirty="0" smtClean="0"/>
+              <a:t>Custom Action Filters</a:t>
+            </a:r>
+          </a:p>
+          <a:p>
+            <a:pPr lvl="1"/>
+            <a:r>
+              <a:rPr lang="en-US" sz="2000" dirty="0" smtClean="0"/>
+              <a:t>Custom Formatters</a:t>
+            </a:r>
+          </a:p>
+          <a:p>
+            <a:pPr lvl="1"/>
+            <a:endParaRPr lang="en-US" sz="2000" dirty="0" smtClean="0"/>
           </a:p>
           <a:p>
             <a:r>
               <a:rPr lang="en-US" sz="2400" dirty="0" smtClean="0"/>
-              <a:t>Can run side-by-side with Web Forms, SignalR, etc.</a:t>
-            </a:r>
-          </a:p>
-          <a:p>
-            <a:endParaRPr lang="en-US" sz="2400" dirty="0" smtClean="0"/>
-          </a:p>
-          <a:p>
-            <a:r>
-              <a:rPr lang="en-US" sz="2400" dirty="0" smtClean="0"/>
-              <a:t>Cookies, Session, Caching, etc. still work the same</a:t>
+              <a:t>All code is released as open source</a:t>
             </a:r>
           </a:p>
         </p:txBody>
       </p:sp>
     </p:spTree>
+    <p:extLst>
+      <p:ext uri="{BB962C8B-B14F-4D97-AF65-F5344CB8AC3E}">
+        <p14:creationId xmlns:p14="http://schemas.microsoft.com/office/powerpoint/2010/main" val="573997567"/>
+      </p:ext>
+    </p:extLst>
   </p:cSld>
   <p:clrMapOvr>
     <a:masterClrMapping/>
@@ -15097,6 +15106,106 @@
       </p:grpSpPr>
       <p:sp>
         <p:nvSpPr>
+          <p:cNvPr id="2" name="Title 1"/>
+          <p:cNvSpPr>
+            <a:spLocks noGrp="1"/>
+          </p:cNvSpPr>
+          <p:nvPr>
+            <p:ph type="title"/>
+          </p:nvPr>
+        </p:nvSpPr>
+        <p:spPr/>
+        <p:txBody>
+          <a:bodyPr/>
+          <a:lstStyle/>
+          <a:p>
+            <a:r>
+              <a:rPr lang="en-US" sz="3200" dirty="0"/>
+              <a:t>MVC: The good parts</a:t>
+            </a:r>
+            <a:endParaRPr lang="en-US" dirty="0"/>
+          </a:p>
+        </p:txBody>
+      </p:sp>
+      <p:sp>
+        <p:nvSpPr>
+          <p:cNvPr id="3" name="Subtitle 2"/>
+          <p:cNvSpPr>
+            <a:spLocks noGrp="1"/>
+          </p:cNvSpPr>
+          <p:nvPr>
+            <p:ph idx="1"/>
+          </p:nvPr>
+        </p:nvSpPr>
+        <p:spPr/>
+        <p:txBody>
+          <a:bodyPr>
+            <a:normAutofit/>
+          </a:bodyPr>
+          <a:lstStyle/>
+          <a:p>
+            <a:r>
+              <a:rPr lang="en-US" sz="2400" dirty="0" smtClean="0"/>
+              <a:t>Part of ASP.NET, same security model</a:t>
+            </a:r>
+          </a:p>
+          <a:p>
+            <a:endParaRPr lang="en-US" sz="2400" dirty="0" smtClean="0"/>
+          </a:p>
+          <a:p>
+            <a:r>
+              <a:rPr lang="en-US" sz="2400" dirty="0" smtClean="0"/>
+              <a:t>Can run side-by-side with Web Forms, SignalR, etc.</a:t>
+            </a:r>
+          </a:p>
+          <a:p>
+            <a:endParaRPr lang="en-US" sz="2400" dirty="0" smtClean="0"/>
+          </a:p>
+          <a:p>
+            <a:r>
+              <a:rPr lang="en-US" sz="2400" dirty="0" smtClean="0"/>
+              <a:t>Cookies, Session, Caching, etc. still work the same</a:t>
+            </a:r>
+          </a:p>
+        </p:txBody>
+      </p:sp>
+    </p:spTree>
+  </p:cSld>
+  <p:clrMapOvr>
+    <a:masterClrMapping/>
+  </p:clrMapOvr>
+  <p:transition>
+    <p:fade/>
+  </p:transition>
+  <p:timing>
+    <p:tnLst>
+      <p:par>
+        <p:cTn id="1" dur="indefinite" restart="never" nodeType="tmRoot"/>
+      </p:par>
+    </p:tnLst>
+  </p:timing>
+</p:sld>
+</file>
+
+<file path=ppt/slides/slide32.xml><?xml version="1.0" encoding="utf-8"?>
+<p:sld xmlns:a="http://schemas.openxmlformats.org/drawingml/2006/main" xmlns:r="http://schemas.openxmlformats.org/officeDocument/2006/relationships" xmlns:p="http://schemas.openxmlformats.org/presentationml/2006/main">
+  <p:cSld>
+    <p:spTree>
+      <p:nvGrpSpPr>
+        <p:cNvPr id="1" name=""/>
+        <p:cNvGrpSpPr/>
+        <p:nvPr/>
+      </p:nvGrpSpPr>
+      <p:grpSpPr>
+        <a:xfrm>
+          <a:off x="0" y="0"/>
+          <a:ext cx="0" cy="0"/>
+          <a:chOff x="0" y="0"/>
+          <a:chExt cx="0" cy="0"/>
+        </a:xfrm>
+      </p:grpSpPr>
+      <p:sp>
+        <p:nvSpPr>
           <p:cNvPr id="3" name="Title 2"/>
           <p:cNvSpPr>
             <a:spLocks noGrp="1"/>
@@ -15190,7 +15299,7 @@
 </p:sld>
 </file>
 
-<file path=ppt/slides/slide32.xml><?xml version="1.0" encoding="utf-8"?>
+<file path=ppt/slides/slide33.xml><?xml version="1.0" encoding="utf-8"?>
 <p:sld xmlns:a="http://schemas.openxmlformats.org/drawingml/2006/main" xmlns:r="http://schemas.openxmlformats.org/officeDocument/2006/relationships" xmlns:p="http://schemas.openxmlformats.org/presentationml/2006/main">
   <p:cSld>
     <p:spTree>
@@ -17857,6 +17966,9 @@
                     <p:cTn id="3" fill="hold">
                       <p:stCondLst>
                         <p:cond delay="indefinite"/>
+                        <p:cond evt="onBegin" delay="0">
+                          <p:tn val="2"/>
+                        </p:cond>
                       </p:stCondLst>
                       <p:childTnLst>
                         <p:par>
@@ -17866,7 +17978,7 @@
                             </p:stCondLst>
                             <p:childTnLst>
                               <p:par>
-                                <p:cTn id="5" presetID="4" presetClass="entr" presetSubtype="16" fill="hold" grpId="0" nodeType="clickEffect">
+                                <p:cTn id="5" presetID="4" presetClass="entr" presetSubtype="16" fill="hold" grpId="0" nodeType="withEffect">
                                   <p:stCondLst>
                                     <p:cond delay="0"/>
                                   </p:stCondLst>
@@ -17935,33 +18047,15 @@
                                   </p:childTnLst>
                                 </p:cTn>
                               </p:par>
-                            </p:childTnLst>
-                          </p:cTn>
-                        </p:par>
-                      </p:childTnLst>
-                    </p:cTn>
-                  </p:par>
-                  <p:par>
-                    <p:cTn id="11" fill="hold">
-                      <p:stCondLst>
-                        <p:cond delay="indefinite"/>
-                      </p:stCondLst>
-                      <p:childTnLst>
-                        <p:par>
-                          <p:cTn id="12" fill="hold">
-                            <p:stCondLst>
-                              <p:cond delay="0"/>
-                            </p:stCondLst>
-                            <p:childTnLst>
                               <p:par>
-                                <p:cTn id="13" presetID="4" presetClass="entr" presetSubtype="16" fill="hold" grpId="0" nodeType="clickEffect">
+                                <p:cTn id="11" presetID="4" presetClass="entr" presetSubtype="16" fill="hold" grpId="0" nodeType="withEffect">
                                   <p:stCondLst>
                                     <p:cond delay="0"/>
                                   </p:stCondLst>
                                   <p:childTnLst>
                                     <p:set>
                                       <p:cBhvr>
-                                        <p:cTn id="14" dur="1" fill="hold">
+                                        <p:cTn id="12" dur="1" fill="hold">
                                           <p:stCondLst>
                                             <p:cond delay="0"/>
                                           </p:stCondLst>
@@ -17979,7 +18073,7 @@
                                     </p:set>
                                     <p:animEffect transition="in" filter="box(in)">
                                       <p:cBhvr>
-                                        <p:cTn id="15" dur="500"/>
+                                        <p:cTn id="13" dur="500"/>
                                         <p:tgtEl>
                                           <p:spTgt spid="23"/>
                                         </p:tgtEl>
@@ -17989,14 +18083,14 @@
                                 </p:cTn>
                               </p:par>
                               <p:par>
-                                <p:cTn id="16" presetID="4" presetClass="entr" presetSubtype="16" fill="hold" grpId="0" nodeType="withEffect">
+                                <p:cTn id="14" presetID="4" presetClass="entr" presetSubtype="16" fill="hold" grpId="0" nodeType="withEffect">
                                   <p:stCondLst>
                                     <p:cond delay="0"/>
                                   </p:stCondLst>
                                   <p:childTnLst>
                                     <p:set>
                                       <p:cBhvr>
-                                        <p:cTn id="17" dur="1" fill="hold">
+                                        <p:cTn id="15" dur="1" fill="hold">
                                           <p:stCondLst>
                                             <p:cond delay="0"/>
                                           </p:stCondLst>
@@ -18014,9 +18108,44 @@
                                     </p:set>
                                     <p:animEffect transition="in" filter="box(in)">
                                       <p:cBhvr>
-                                        <p:cTn id="18" dur="500"/>
+                                        <p:cTn id="16" dur="500"/>
                                         <p:tgtEl>
                                           <p:spTgt spid="4"/>
+                                        </p:tgtEl>
+                                      </p:cBhvr>
+                                    </p:animEffect>
+                                  </p:childTnLst>
+                                </p:cTn>
+                              </p:par>
+                              <p:par>
+                                <p:cTn id="17" presetID="4" presetClass="entr" presetSubtype="16" fill="hold" grpId="0" nodeType="withEffect">
+                                  <p:stCondLst>
+                                    <p:cond delay="0"/>
+                                  </p:stCondLst>
+                                  <p:childTnLst>
+                                    <p:set>
+                                      <p:cBhvr>
+                                        <p:cTn id="18" dur="1" fill="hold">
+                                          <p:stCondLst>
+                                            <p:cond delay="0"/>
+                                          </p:stCondLst>
+                                        </p:cTn>
+                                        <p:tgtEl>
+                                          <p:spTgt spid="35"/>
+                                        </p:tgtEl>
+                                        <p:attrNameLst>
+                                          <p:attrName>style.visibility</p:attrName>
+                                        </p:attrNameLst>
+                                      </p:cBhvr>
+                                      <p:to>
+                                        <p:strVal val="visible"/>
+                                      </p:to>
+                                    </p:set>
+                                    <p:animEffect transition="in" filter="box(in)">
+                                      <p:cBhvr>
+                                        <p:cTn id="19" dur="500"/>
+                                        <p:tgtEl>
+                                          <p:spTgt spid="35"/>
                                         </p:tgtEl>
                                       </p:cBhvr>
                                     </p:animEffect>
@@ -18030,32 +18159,32 @@
                     </p:cTn>
                   </p:par>
                   <p:par>
-                    <p:cTn id="19" fill="hold">
+                    <p:cTn id="20" fill="hold">
                       <p:stCondLst>
                         <p:cond delay="indefinite"/>
                       </p:stCondLst>
                       <p:childTnLst>
                         <p:par>
-                          <p:cTn id="20" fill="hold">
+                          <p:cTn id="21" fill="hold">
                             <p:stCondLst>
                               <p:cond delay="0"/>
                             </p:stCondLst>
                             <p:childTnLst>
                               <p:par>
-                                <p:cTn id="21" presetID="4" presetClass="entr" presetSubtype="16" fill="hold" grpId="0" nodeType="clickEffect">
+                                <p:cTn id="22" presetID="4" presetClass="entr" presetSubtype="16" fill="hold" nodeType="clickEffect">
                                   <p:stCondLst>
                                     <p:cond delay="0"/>
                                   </p:stCondLst>
                                   <p:childTnLst>
                                     <p:set>
                                       <p:cBhvr>
-                                        <p:cTn id="22" dur="1" fill="hold">
+                                        <p:cTn id="23" dur="1" fill="hold">
                                           <p:stCondLst>
                                             <p:cond delay="0"/>
                                           </p:stCondLst>
                                         </p:cTn>
                                         <p:tgtEl>
-                                          <p:spTgt spid="35"/>
+                                          <p:spTgt spid="7"/>
                                         </p:tgtEl>
                                         <p:attrNameLst>
                                           <p:attrName>style.visibility</p:attrName>
@@ -18067,9 +18196,79 @@
                                     </p:set>
                                     <p:animEffect transition="in" filter="box(in)">
                                       <p:cBhvr>
-                                        <p:cTn id="23" dur="500"/>
-                                        <p:tgtEl>
-                                          <p:spTgt spid="35"/>
+                                        <p:cTn id="24" dur="500"/>
+                                        <p:tgtEl>
+                                          <p:spTgt spid="7"/>
+                                        </p:tgtEl>
+                                      </p:cBhvr>
+                                    </p:animEffect>
+                                  </p:childTnLst>
+                                </p:cTn>
+                              </p:par>
+                              <p:par>
+                                <p:cTn id="25" presetID="4" presetClass="entr" presetSubtype="16" fill="hold" grpId="0" nodeType="withEffect">
+                                  <p:stCondLst>
+                                    <p:cond delay="0"/>
+                                  </p:stCondLst>
+                                  <p:childTnLst>
+                                    <p:set>
+                                      <p:cBhvr>
+                                        <p:cTn id="26" dur="1" fill="hold">
+                                          <p:stCondLst>
+                                            <p:cond delay="0"/>
+                                          </p:stCondLst>
+                                        </p:cTn>
+                                        <p:tgtEl>
+                                          <p:spTgt spid="17"/>
+                                        </p:tgtEl>
+                                        <p:attrNameLst>
+                                          <p:attrName>style.visibility</p:attrName>
+                                        </p:attrNameLst>
+                                      </p:cBhvr>
+                                      <p:to>
+                                        <p:strVal val="visible"/>
+                                      </p:to>
+                                    </p:set>
+                                    <p:animEffect transition="in" filter="box(in)">
+                                      <p:cBhvr>
+                                        <p:cTn id="27" dur="500"/>
+                                        <p:tgtEl>
+                                          <p:spTgt spid="17"/>
+                                        </p:tgtEl>
+                                      </p:cBhvr>
+                                    </p:animEffect>
+                                  </p:childTnLst>
+                                </p:cTn>
+                              </p:par>
+                              <p:par>
+                                <p:cTn id="28" presetID="4" presetClass="entr" presetSubtype="16" fill="hold" grpId="0" nodeType="withEffect">
+                                  <p:stCondLst>
+                                    <p:cond delay="0"/>
+                                  </p:stCondLst>
+                                  <p:childTnLst>
+                                    <p:set>
+                                      <p:cBhvr>
+                                        <p:cTn id="29" dur="1" fill="hold">
+                                          <p:stCondLst>
+                                            <p:cond delay="0"/>
+                                          </p:stCondLst>
+                                        </p:cTn>
+                                        <p:tgtEl>
+                                          <p:spTgt spid="39"/>
+                                        </p:tgtEl>
+                                        <p:attrNameLst>
+                                          <p:attrName>style.visibility</p:attrName>
+                                        </p:attrNameLst>
+                                      </p:cBhvr>
+                                      <p:to>
+                                        <p:strVal val="visible"/>
+                                      </p:to>
+                                    </p:set>
+                                    <p:animEffect transition="in" filter="box(in)">
+                                      <p:cBhvr>
+                                        <p:cTn id="30" dur="500"/>
+                                        <p:tgtEl>
+                                          <p:spTgt spid="39"/>
                                         </p:tgtEl>
                                       </p:cBhvr>
                                     </p:animEffect>
@@ -18083,32 +18282,32 @@
                     </p:cTn>
                   </p:par>
                   <p:par>
-                    <p:cTn id="24" fill="hold">
+                    <p:cTn id="31" fill="hold">
                       <p:stCondLst>
                         <p:cond delay="indefinite"/>
                       </p:stCondLst>
                       <p:childTnLst>
                         <p:par>
-                          <p:cTn id="25" fill="hold">
+                          <p:cTn id="32" fill="hold">
                             <p:stCondLst>
                               <p:cond delay="0"/>
                             </p:stCondLst>
                             <p:childTnLst>
                               <p:par>
-                                <p:cTn id="26" presetID="4" presetClass="entr" presetSubtype="16" fill="hold" nodeType="clickEffect">
+                                <p:cTn id="33" presetID="4" presetClass="entr" presetSubtype="16" fill="hold" nodeType="clickEffect">
                                   <p:stCondLst>
                                     <p:cond delay="0"/>
                                   </p:stCondLst>
                                   <p:childTnLst>
                                     <p:set>
                                       <p:cBhvr>
-                                        <p:cTn id="27" dur="1" fill="hold">
+                                        <p:cTn id="34" dur="1" fill="hold">
                                           <p:stCondLst>
                                             <p:cond delay="0"/>
                                           </p:stCondLst>
                                         </p:cTn>
                                         <p:tgtEl>
-                                          <p:spTgt spid="7"/>
+                                          <p:spTgt spid="29"/>
                                         </p:tgtEl>
                                         <p:attrNameLst>
                                           <p:attrName>style.visibility</p:attrName>
@@ -18120,9 +18319,9 @@
                                     </p:set>
                                     <p:animEffect transition="in" filter="box(in)">
                                       <p:cBhvr>
-                                        <p:cTn id="28" dur="500"/>
-                                        <p:tgtEl>
-                                          <p:spTgt spid="7"/>
+                                        <p:cTn id="35" dur="500"/>
+                                        <p:tgtEl>
+                                          <p:spTgt spid="29"/>
                                         </p:tgtEl>
                                       </p:cBhvr>
                                     </p:animEffect>
@@ -18130,20 +18329,20 @@
                                 </p:cTn>
                               </p:par>
                               <p:par>
-                                <p:cTn id="29" presetID="4" presetClass="entr" presetSubtype="16" fill="hold" grpId="0" nodeType="withEffect">
+                                <p:cTn id="36" presetID="4" presetClass="entr" presetSubtype="16" fill="hold" grpId="0" nodeType="withEffect">
                                   <p:stCondLst>
                                     <p:cond delay="0"/>
                                   </p:stCondLst>
                                   <p:childTnLst>
                                     <p:set>
                                       <p:cBhvr>
-                                        <p:cTn id="30" dur="1" fill="hold">
+                                        <p:cTn id="37" dur="1" fill="hold">
                                           <p:stCondLst>
                                             <p:cond delay="0"/>
                                           </p:stCondLst>
                                         </p:cTn>
                                         <p:tgtEl>
-                                          <p:spTgt spid="17"/>
+                                          <p:spTgt spid="40"/>
                                         </p:tgtEl>
                                         <p:attrNameLst>
                                           <p:attrName>style.visibility</p:attrName>
@@ -18155,9 +18354,9 @@
                                     </p:set>
                                     <p:animEffect transition="in" filter="box(in)">
                                       <p:cBhvr>
-                                        <p:cTn id="31" dur="500"/>
-                                        <p:tgtEl>
-                                          <p:spTgt spid="17"/>
+                                        <p:cTn id="38" dur="500"/>
+                                        <p:tgtEl>
+                                          <p:spTgt spid="40"/>
                                         </p:tgtEl>
                                       </p:cBhvr>
                                     </p:animEffect>
@@ -18165,20 +18364,20 @@
                                 </p:cTn>
                               </p:par>
                               <p:par>
-                                <p:cTn id="32" presetID="4" presetClass="entr" presetSubtype="16" fill="hold" grpId="0" nodeType="withEffect">
+                                <p:cTn id="39" presetID="4" presetClass="entr" presetSubtype="16" fill="hold" grpId="0" nodeType="withEffect">
                                   <p:stCondLst>
                                     <p:cond delay="0"/>
                                   </p:stCondLst>
                                   <p:childTnLst>
                                     <p:set>
                                       <p:cBhvr>
-                                        <p:cTn id="33" dur="1" fill="hold">
+                                        <p:cTn id="40" dur="1" fill="hold">
                                           <p:stCondLst>
                                             <p:cond delay="0"/>
                                           </p:stCondLst>
                                         </p:cTn>
                                         <p:tgtEl>
-                                          <p:spTgt spid="39"/>
+                                          <p:spTgt spid="37"/>
                                         </p:tgtEl>
                                         <p:attrNameLst>
                                           <p:attrName>style.visibility</p:attrName>
@@ -18190,9 +18389,9 @@
                                     </p:set>
                                     <p:animEffect transition="in" filter="box(in)">
                                       <p:cBhvr>
-                                        <p:cTn id="34" dur="500"/>
-                                        <p:tgtEl>
-                                          <p:spTgt spid="39"/>
+                                        <p:cTn id="41" dur="500"/>
+                                        <p:tgtEl>
+                                          <p:spTgt spid="37"/>
                                         </p:tgtEl>
                                       </p:cBhvr>
                                     </p:animEffect>
@@ -18206,32 +18405,32 @@
                     </p:cTn>
                   </p:par>
                   <p:par>
-                    <p:cTn id="35" fill="hold">
+                    <p:cTn id="42" fill="hold">
                       <p:stCondLst>
                         <p:cond delay="indefinite"/>
                       </p:stCondLst>
                       <p:childTnLst>
                         <p:par>
-                          <p:cTn id="36" fill="hold">
+                          <p:cTn id="43" fill="hold">
                             <p:stCondLst>
                               <p:cond delay="0"/>
                             </p:stCondLst>
                             <p:childTnLst>
                               <p:par>
-                                <p:cTn id="37" presetID="4" presetClass="entr" presetSubtype="16" fill="hold" nodeType="clickEffect">
+                                <p:cTn id="44" presetID="4" presetClass="entr" presetSubtype="16" fill="hold" grpId="0" nodeType="clickEffect">
                                   <p:stCondLst>
                                     <p:cond delay="0"/>
                                   </p:stCondLst>
                                   <p:childTnLst>
                                     <p:set>
                                       <p:cBhvr>
-                                        <p:cTn id="38" dur="1" fill="hold">
+                                        <p:cTn id="45" dur="1" fill="hold">
                                           <p:stCondLst>
                                             <p:cond delay="0"/>
                                           </p:stCondLst>
                                         </p:cTn>
                                         <p:tgtEl>
-                                          <p:spTgt spid="29"/>
+                                          <p:spTgt spid="20"/>
                                         </p:tgtEl>
                                         <p:attrNameLst>
                                           <p:attrName>style.visibility</p:attrName>
@@ -18243,9 +18442,9 @@
                                     </p:set>
                                     <p:animEffect transition="in" filter="box(in)">
                                       <p:cBhvr>
-                                        <p:cTn id="39" dur="500"/>
-                                        <p:tgtEl>
-                                          <p:spTgt spid="29"/>
+                                        <p:cTn id="46" dur="500"/>
+                                        <p:tgtEl>
+                                          <p:spTgt spid="20"/>
                                         </p:tgtEl>
                                       </p:cBhvr>
                                     </p:animEffect>
@@ -18253,20 +18452,20 @@
                                 </p:cTn>
                               </p:par>
                               <p:par>
-                                <p:cTn id="40" presetID="4" presetClass="entr" presetSubtype="16" fill="hold" grpId="0" nodeType="withEffect">
+                                <p:cTn id="47" presetID="4" presetClass="entr" presetSubtype="16" fill="hold" grpId="0" nodeType="withEffect">
                                   <p:stCondLst>
                                     <p:cond delay="0"/>
                                   </p:stCondLst>
                                   <p:childTnLst>
                                     <p:set>
                                       <p:cBhvr>
-                                        <p:cTn id="41" dur="1" fill="hold">
+                                        <p:cTn id="48" dur="1" fill="hold">
                                           <p:stCondLst>
                                             <p:cond delay="0"/>
                                           </p:stCondLst>
                                         </p:cTn>
                                         <p:tgtEl>
-                                          <p:spTgt spid="40"/>
+                                          <p:spTgt spid="24"/>
                                         </p:tgtEl>
                                         <p:attrNameLst>
                                           <p:attrName>style.visibility</p:attrName>
@@ -18278,9 +18477,9 @@
                                     </p:set>
                                     <p:animEffect transition="in" filter="box(in)">
                                       <p:cBhvr>
-                                        <p:cTn id="42" dur="500"/>
-                                        <p:tgtEl>
-                                          <p:spTgt spid="40"/>
+                                        <p:cTn id="49" dur="500"/>
+                                        <p:tgtEl>
+                                          <p:spTgt spid="24"/>
                                         </p:tgtEl>
                                       </p:cBhvr>
                                     </p:animEffect>
@@ -18288,20 +18487,20 @@
                                 </p:cTn>
                               </p:par>
                               <p:par>
-                                <p:cTn id="43" presetID="4" presetClass="entr" presetSubtype="16" fill="hold" grpId="0" nodeType="withEffect">
+                                <p:cTn id="50" presetID="4" presetClass="entr" presetSubtype="16" fill="hold" grpId="0" nodeType="withEffect">
                                   <p:stCondLst>
                                     <p:cond delay="0"/>
                                   </p:stCondLst>
                                   <p:childTnLst>
                                     <p:set>
                                       <p:cBhvr>
-                                        <p:cTn id="44" dur="1" fill="hold">
+                                        <p:cTn id="51" dur="1" fill="hold">
                                           <p:stCondLst>
                                             <p:cond delay="0"/>
                                           </p:stCondLst>
                                         </p:cTn>
                                         <p:tgtEl>
-                                          <p:spTgt spid="37"/>
+                                          <p:spTgt spid="21"/>
                                         </p:tgtEl>
                                         <p:attrNameLst>
                                           <p:attrName>style.visibility</p:attrName>
@@ -18313,48 +18512,30 @@
                                     </p:set>
                                     <p:animEffect transition="in" filter="box(in)">
                                       <p:cBhvr>
-                                        <p:cTn id="45" dur="500"/>
-                                        <p:tgtEl>
-                                          <p:spTgt spid="37"/>
+                                        <p:cTn id="52" dur="500"/>
+                                        <p:tgtEl>
+                                          <p:spTgt spid="21"/>
                                         </p:tgtEl>
                                       </p:cBhvr>
                                     </p:animEffect>
                                   </p:childTnLst>
                                 </p:cTn>
                               </p:par>
-                            </p:childTnLst>
-                          </p:cTn>
-                        </p:par>
-                      </p:childTnLst>
-                    </p:cTn>
-                  </p:par>
-                  <p:par>
-                    <p:cTn id="46" fill="hold">
-                      <p:stCondLst>
-                        <p:cond delay="indefinite"/>
-                      </p:stCondLst>
-                      <p:childTnLst>
-                        <p:par>
-                          <p:cTn id="47" fill="hold">
-                            <p:stCondLst>
-                              <p:cond delay="0"/>
-                            </p:stCondLst>
-                            <p:childTnLst>
                               <p:par>
-                                <p:cTn id="48" presetID="4" presetClass="entr" presetSubtype="16" fill="hold" grpId="0" nodeType="clickEffect">
+                                <p:cTn id="53" presetID="4" presetClass="entr" presetSubtype="16" fill="hold" grpId="0" nodeType="withEffect">
                                   <p:stCondLst>
                                     <p:cond delay="0"/>
                                   </p:stCondLst>
                                   <p:childTnLst>
                                     <p:set>
                                       <p:cBhvr>
-                                        <p:cTn id="49" dur="1" fill="hold">
+                                        <p:cTn id="54" dur="1" fill="hold">
                                           <p:stCondLst>
                                             <p:cond delay="0"/>
                                           </p:stCondLst>
                                         </p:cTn>
                                         <p:tgtEl>
-                                          <p:spTgt spid="20"/>
+                                          <p:spTgt spid="36"/>
                                         </p:tgtEl>
                                         <p:attrNameLst>
                                           <p:attrName>style.visibility</p:attrName>
@@ -18366,9 +18547,9 @@
                                     </p:set>
                                     <p:animEffect transition="in" filter="box(in)">
                                       <p:cBhvr>
-                                        <p:cTn id="50" dur="500"/>
-                                        <p:tgtEl>
-                                          <p:spTgt spid="20"/>
+                                        <p:cTn id="55" dur="500"/>
+                                        <p:tgtEl>
+                                          <p:spTgt spid="36"/>
                                         </p:tgtEl>
                                       </p:cBhvr>
                                     </p:animEffect>
@@ -18376,60 +18557,7 @@
                                 </p:cTn>
                               </p:par>
                               <p:par>
-                                <p:cTn id="51" presetID="4" presetClass="entr" presetSubtype="16" fill="hold" grpId="0" nodeType="withEffect">
-                                  <p:stCondLst>
-                                    <p:cond delay="0"/>
-                                  </p:stCondLst>
-                                  <p:childTnLst>
-                                    <p:set>
-                                      <p:cBhvr>
-                                        <p:cTn id="52" dur="1" fill="hold">
-                                          <p:stCondLst>
-                                            <p:cond delay="0"/>
-                                          </p:stCondLst>
-                                        </p:cTn>
-                                        <p:tgtEl>
-                                          <p:spTgt spid="24"/>
-                                        </p:tgtEl>
-                                        <p:attrNameLst>
-                                          <p:attrName>style.visibility</p:attrName>
-                                        </p:attrNameLst>
-                                      </p:cBhvr>
-                                      <p:to>
-                                        <p:strVal val="visible"/>
-                                      </p:to>
-                                    </p:set>
-                                    <p:animEffect transition="in" filter="box(in)">
-                                      <p:cBhvr>
-                                        <p:cTn id="53" dur="500"/>
-                                        <p:tgtEl>
-                                          <p:spTgt spid="24"/>
-                                        </p:tgtEl>
-                                      </p:cBhvr>
-                                    </p:animEffect>
-                                  </p:childTnLst>
-                                </p:cTn>
-                              </p:par>
-                            </p:childTnLst>
-                          </p:cTn>
-                        </p:par>
-                      </p:childTnLst>
-                    </p:cTn>
-                  </p:par>
-                  <p:par>
-                    <p:cTn id="54" fill="hold">
-                      <p:stCondLst>
-                        <p:cond delay="indefinite"/>
-                      </p:stCondLst>
-                      <p:childTnLst>
-                        <p:par>
-                          <p:cTn id="55" fill="hold">
-                            <p:stCondLst>
-                              <p:cond delay="0"/>
-                            </p:stCondLst>
-                            <p:childTnLst>
-                              <p:par>
-                                <p:cTn id="56" presetID="4" presetClass="entr" presetSubtype="16" fill="hold" grpId="0" nodeType="clickEffect">
+                                <p:cTn id="56" presetID="4" presetClass="entr" presetSubtype="16" fill="hold" grpId="0" nodeType="withEffect">
                                   <p:stCondLst>
                                     <p:cond delay="0"/>
                                   </p:stCondLst>
@@ -18442,7 +18570,7 @@
                                           </p:stCondLst>
                                         </p:cTn>
                                         <p:tgtEl>
-                                          <p:spTgt spid="21"/>
+                                          <p:spTgt spid="18"/>
                                         </p:tgtEl>
                                         <p:attrNameLst>
                                           <p:attrName>style.visibility</p:attrName>
@@ -18455,76 +18583,6 @@
                                     <p:animEffect transition="in" filter="box(in)">
                                       <p:cBhvr>
                                         <p:cTn id="58" dur="500"/>
-                                        <p:tgtEl>
-                                          <p:spTgt spid="21"/>
-                                        </p:tgtEl>
-                                      </p:cBhvr>
-                                    </p:animEffect>
-                                  </p:childTnLst>
-                                </p:cTn>
-                              </p:par>
-                              <p:par>
-                                <p:cTn id="59" presetID="4" presetClass="entr" presetSubtype="16" fill="hold" grpId="0" nodeType="withEffect">
-                                  <p:stCondLst>
-                                    <p:cond delay="0"/>
-                                  </p:stCondLst>
-                                  <p:childTnLst>
-                                    <p:set>
-                                      <p:cBhvr>
-                                        <p:cTn id="60" dur="1" fill="hold">
-                                          <p:stCondLst>
-                                            <p:cond delay="0"/>
-                                          </p:stCondLst>
-                                        </p:cTn>
-                                        <p:tgtEl>
-                                          <p:spTgt spid="36"/>
-                                        </p:tgtEl>
-                                        <p:attrNameLst>
-                                          <p:attrName>style.visibility</p:attrName>
-                                        </p:attrNameLst>
-                                      </p:cBhvr>
-                                      <p:to>
-                                        <p:strVal val="visible"/>
-                                      </p:to>
-                                    </p:set>
-                                    <p:animEffect transition="in" filter="box(in)">
-                                      <p:cBhvr>
-                                        <p:cTn id="61" dur="500"/>
-                                        <p:tgtEl>
-                                          <p:spTgt spid="36"/>
-                                        </p:tgtEl>
-                                      </p:cBhvr>
-                                    </p:animEffect>
-                                  </p:childTnLst>
-                                </p:cTn>
-                              </p:par>
-                              <p:par>
-                                <p:cTn id="62" presetID="4" presetClass="entr" presetSubtype="16" fill="hold" grpId="0" nodeType="withEffect">
-                                  <p:stCondLst>
-                                    <p:cond delay="0"/>
-                                  </p:stCondLst>
-                                  <p:childTnLst>
-                                    <p:set>
-                                      <p:cBhvr>
-                                        <p:cTn id="63" dur="1" fill="hold">
-                                          <p:stCondLst>
-                                            <p:cond delay="0"/>
-                                          </p:stCondLst>
-                                        </p:cTn>
-                                        <p:tgtEl>
-                                          <p:spTgt spid="18"/>
-                                        </p:tgtEl>
-                                        <p:attrNameLst>
-                                          <p:attrName>style.visibility</p:attrName>
-                                        </p:attrNameLst>
-                                      </p:cBhvr>
-                                      <p:to>
-                                        <p:strVal val="visible"/>
-                                      </p:to>
-                                    </p:set>
-                                    <p:animEffect transition="in" filter="box(in)">
-                                      <p:cBhvr>
-                                        <p:cTn id="64" dur="500"/>
                                         <p:tgtEl>
                                           <p:spTgt spid="18"/>
                                         </p:tgtEl>
@@ -19203,6 +19261,9 @@
                     <p:cTn id="3" fill="hold">
                       <p:stCondLst>
                         <p:cond delay="indefinite"/>
+                        <p:cond evt="onBegin" delay="0">
+                          <p:tn val="2"/>
+                        </p:cond>
                       </p:stCondLst>
                       <p:childTnLst>
                         <p:par>
@@ -19212,7 +19273,7 @@
                             </p:stCondLst>
                             <p:childTnLst>
                               <p:par>
-                                <p:cTn id="5" presetID="4" presetClass="entr" presetSubtype="16" fill="hold" grpId="0" nodeType="clickEffect">
+                                <p:cTn id="5" presetID="4" presetClass="entr" presetSubtype="16" fill="hold" grpId="0" nodeType="withEffect">
                                   <p:stCondLst>
                                     <p:cond delay="0"/>
                                   </p:stCondLst>
@@ -19246,33 +19307,15 @@
                                   </p:childTnLst>
                                 </p:cTn>
                               </p:par>
-                            </p:childTnLst>
-                          </p:cTn>
-                        </p:par>
-                      </p:childTnLst>
-                    </p:cTn>
-                  </p:par>
-                  <p:par>
-                    <p:cTn id="8" fill="hold">
-                      <p:stCondLst>
-                        <p:cond delay="indefinite"/>
-                      </p:stCondLst>
-                      <p:childTnLst>
-                        <p:par>
-                          <p:cTn id="9" fill="hold">
-                            <p:stCondLst>
-                              <p:cond delay="0"/>
-                            </p:stCondLst>
-                            <p:childTnLst>
                               <p:par>
-                                <p:cTn id="10" presetID="4" presetClass="entr" presetSubtype="16" fill="hold" grpId="0" nodeType="clickEffect">
+                                <p:cTn id="8" presetID="4" presetClass="entr" presetSubtype="16" fill="hold" grpId="0" nodeType="withEffect">
                                   <p:stCondLst>
                                     <p:cond delay="0"/>
                                   </p:stCondLst>
                                   <p:childTnLst>
                                     <p:set>
                                       <p:cBhvr>
-                                        <p:cTn id="11" dur="1" fill="hold">
+                                        <p:cTn id="9" dur="1" fill="hold">
                                           <p:stCondLst>
                                             <p:cond delay="0"/>
                                           </p:stCondLst>
@@ -19290,7 +19333,7 @@
                                     </p:set>
                                     <p:animEffect transition="in" filter="box(in)">
                                       <p:cBhvr>
-                                        <p:cTn id="12" dur="500"/>
+                                        <p:cTn id="10" dur="500"/>
                                         <p:tgtEl>
                                           <p:spTgt spid="35"/>
                                         </p:tgtEl>
@@ -19300,14 +19343,14 @@
                                 </p:cTn>
                               </p:par>
                               <p:par>
-                                <p:cTn id="13" presetID="4" presetClass="entr" presetSubtype="16" fill="hold" grpId="0" nodeType="withEffect">
+                                <p:cTn id="11" presetID="4" presetClass="entr" presetSubtype="16" fill="hold" grpId="0" nodeType="withEffect">
                                   <p:stCondLst>
                                     <p:cond delay="0"/>
                                   </p:stCondLst>
                                   <p:childTnLst>
                                     <p:set>
                                       <p:cBhvr>
-                                        <p:cTn id="14" dur="1" fill="hold">
+                                        <p:cTn id="12" dur="1" fill="hold">
                                           <p:stCondLst>
                                             <p:cond delay="0"/>
                                           </p:stCondLst>
@@ -19325,7 +19368,7 @@
                                     </p:set>
                                     <p:animEffect transition="in" filter="box(in)">
                                       <p:cBhvr>
-                                        <p:cTn id="15" dur="500"/>
+                                        <p:cTn id="13" dur="500"/>
                                         <p:tgtEl>
                                           <p:spTgt spid="24"/>
                                         </p:tgtEl>
@@ -19335,14 +19378,14 @@
                                 </p:cTn>
                               </p:par>
                               <p:par>
-                                <p:cTn id="16" presetID="4" presetClass="entr" presetSubtype="16" fill="hold" grpId="0" nodeType="withEffect">
+                                <p:cTn id="14" presetID="4" presetClass="entr" presetSubtype="16" fill="hold" grpId="0" nodeType="withEffect">
                                   <p:stCondLst>
                                     <p:cond delay="0"/>
                                   </p:stCondLst>
                                   <p:childTnLst>
                                     <p:set>
                                       <p:cBhvr>
-                                        <p:cTn id="17" dur="1" fill="hold">
+                                        <p:cTn id="15" dur="1" fill="hold">
                                           <p:stCondLst>
                                             <p:cond delay="0"/>
                                           </p:stCondLst>
@@ -19360,7 +19403,7 @@
                                     </p:set>
                                     <p:animEffect transition="in" filter="box(in)">
                                       <p:cBhvr>
-                                        <p:cTn id="18" dur="500"/>
+                                        <p:cTn id="16" dur="500"/>
                                         <p:tgtEl>
                                           <p:spTgt spid="38"/>
                                         </p:tgtEl>
@@ -19376,26 +19419,26 @@
                     </p:cTn>
                   </p:par>
                   <p:par>
-                    <p:cTn id="19" fill="hold">
+                    <p:cTn id="17" fill="hold">
                       <p:stCondLst>
                         <p:cond delay="indefinite"/>
                       </p:stCondLst>
                       <p:childTnLst>
                         <p:par>
-                          <p:cTn id="20" fill="hold">
+                          <p:cTn id="18" fill="hold">
                             <p:stCondLst>
                               <p:cond delay="0"/>
                             </p:stCondLst>
                             <p:childTnLst>
                               <p:par>
-                                <p:cTn id="21" presetID="4" presetClass="entr" presetSubtype="16" fill="hold" grpId="0" nodeType="clickEffect">
+                                <p:cTn id="19" presetID="4" presetClass="entr" presetSubtype="16" fill="hold" grpId="0" nodeType="clickEffect">
                                   <p:stCondLst>
                                     <p:cond delay="0"/>
                                   </p:stCondLst>
                                   <p:childTnLst>
                                     <p:set>
                                       <p:cBhvr>
-                                        <p:cTn id="22" dur="1" fill="hold">
+                                        <p:cTn id="20" dur="1" fill="hold">
                                           <p:stCondLst>
                                             <p:cond delay="0"/>
                                           </p:stCondLst>
@@ -19413,7 +19456,7 @@
                                     </p:set>
                                     <p:animEffect transition="in" filter="box(in)">
                                       <p:cBhvr>
-                                        <p:cTn id="23" dur="500"/>
+                                        <p:cTn id="21" dur="500"/>
                                         <p:tgtEl>
                                           <p:spTgt spid="26"/>
                                         </p:tgtEl>
@@ -19423,14 +19466,14 @@
                                 </p:cTn>
                               </p:par>
                               <p:par>
-                                <p:cTn id="24" presetID="4" presetClass="entr" presetSubtype="16" fill="hold" grpId="0" nodeType="withEffect">
+                                <p:cTn id="22" presetID="4" presetClass="entr" presetSubtype="16" fill="hold" grpId="0" nodeType="withEffect">
                                   <p:stCondLst>
                                     <p:cond delay="0"/>
                                   </p:stCondLst>
                                   <p:childTnLst>
                                     <p:set>
                                       <p:cBhvr>
-                                        <p:cTn id="25" dur="1" fill="hold">
+                                        <p:cTn id="23" dur="1" fill="hold">
                                           <p:stCondLst>
                                             <p:cond delay="0"/>
                                           </p:stCondLst>
@@ -19448,7 +19491,7 @@
                                     </p:set>
                                     <p:animEffect transition="in" filter="box(in)">
                                       <p:cBhvr>
-                                        <p:cTn id="26" dur="500"/>
+                                        <p:cTn id="24" dur="500"/>
                                         <p:tgtEl>
                                           <p:spTgt spid="34"/>
                                         </p:tgtEl>
@@ -19464,26 +19507,26 @@
                     </p:cTn>
                   </p:par>
                   <p:par>
-                    <p:cTn id="27" fill="hold">
+                    <p:cTn id="25" fill="hold">
                       <p:stCondLst>
                         <p:cond delay="indefinite"/>
                       </p:stCondLst>
                       <p:childTnLst>
                         <p:par>
-                          <p:cTn id="28" fill="hold">
+                          <p:cTn id="26" fill="hold">
                             <p:stCondLst>
                               <p:cond delay="0"/>
                             </p:stCondLst>
                             <p:childTnLst>
                               <p:par>
-                                <p:cTn id="29" presetID="4" presetClass="entr" presetSubtype="16" fill="hold" grpId="0" nodeType="clickEffect">
+                                <p:cTn id="27" presetID="4" presetClass="entr" presetSubtype="16" fill="hold" grpId="0" nodeType="clickEffect">
                                   <p:stCondLst>
                                     <p:cond delay="0"/>
                                   </p:stCondLst>
                                   <p:childTnLst>
                                     <p:set>
                                       <p:cBhvr>
-                                        <p:cTn id="30" dur="1" fill="hold">
+                                        <p:cTn id="28" dur="1" fill="hold">
                                           <p:stCondLst>
                                             <p:cond delay="0"/>
                                           </p:stCondLst>
@@ -19501,7 +19544,7 @@
                                     </p:set>
                                     <p:animEffect transition="in" filter="box(in)">
                                       <p:cBhvr>
-                                        <p:cTn id="31" dur="500"/>
+                                        <p:cTn id="29" dur="500"/>
                                         <p:tgtEl>
                                           <p:spTgt spid="27"/>
                                         </p:tgtEl>
@@ -19517,26 +19560,26 @@
                     </p:cTn>
                   </p:par>
                   <p:par>
-                    <p:cTn id="32" fill="hold">
+                    <p:cTn id="30" fill="hold">
                       <p:stCondLst>
                         <p:cond delay="indefinite"/>
                       </p:stCondLst>
                       <p:childTnLst>
                         <p:par>
-                          <p:cTn id="33" fill="hold">
+                          <p:cTn id="31" fill="hold">
                             <p:stCondLst>
                               <p:cond delay="0"/>
                             </p:stCondLst>
                             <p:childTnLst>
                               <p:par>
-                                <p:cTn id="34" presetID="4" presetClass="entr" presetSubtype="16" fill="hold" grpId="0" nodeType="clickEffect">
+                                <p:cTn id="32" presetID="4" presetClass="entr" presetSubtype="16" fill="hold" grpId="0" nodeType="clickEffect">
                                   <p:stCondLst>
                                     <p:cond delay="0"/>
                                   </p:stCondLst>
                                   <p:childTnLst>
                                     <p:set>
                                       <p:cBhvr>
-                                        <p:cTn id="35" dur="1" fill="hold">
+                                        <p:cTn id="33" dur="1" fill="hold">
                                           <p:stCondLst>
                                             <p:cond delay="0"/>
                                           </p:stCondLst>
@@ -19554,7 +19597,7 @@
                                     </p:set>
                                     <p:animEffect transition="in" filter="box(in)">
                                       <p:cBhvr>
-                                        <p:cTn id="36" dur="500"/>
+                                        <p:cTn id="34" dur="500"/>
                                         <p:tgtEl>
                                           <p:spTgt spid="9"/>
                                         </p:tgtEl>
@@ -19564,14 +19607,14 @@
                                 </p:cTn>
                               </p:par>
                               <p:par>
-                                <p:cTn id="37" presetID="4" presetClass="entr" presetSubtype="16" fill="hold" grpId="0" nodeType="withEffect">
+                                <p:cTn id="35" presetID="4" presetClass="entr" presetSubtype="16" fill="hold" grpId="0" nodeType="withEffect">
                                   <p:stCondLst>
                                     <p:cond delay="0"/>
                                   </p:stCondLst>
                                   <p:childTnLst>
                                     <p:set>
                                       <p:cBhvr>
-                                        <p:cTn id="38" dur="1" fill="hold">
+                                        <p:cTn id="36" dur="1" fill="hold">
                                           <p:stCondLst>
                                             <p:cond delay="0"/>
                                           </p:stCondLst>
@@ -19589,7 +19632,7 @@
                                     </p:set>
                                     <p:animEffect transition="in" filter="box(in)">
                                       <p:cBhvr>
-                                        <p:cTn id="39" dur="500"/>
+                                        <p:cTn id="37" dur="500"/>
                                         <p:tgtEl>
                                           <p:spTgt spid="30"/>
                                         </p:tgtEl>
@@ -19605,26 +19648,26 @@
                     </p:cTn>
                   </p:par>
                   <p:par>
-                    <p:cTn id="40" fill="hold">
+                    <p:cTn id="38" fill="hold">
                       <p:stCondLst>
                         <p:cond delay="indefinite"/>
                       </p:stCondLst>
                       <p:childTnLst>
                         <p:par>
-                          <p:cTn id="41" fill="hold">
+                          <p:cTn id="39" fill="hold">
                             <p:stCondLst>
                               <p:cond delay="0"/>
                             </p:stCondLst>
                             <p:childTnLst>
                               <p:par>
-                                <p:cTn id="42" presetID="4" presetClass="entr" presetSubtype="16" fill="hold" grpId="0" nodeType="clickEffect">
+                                <p:cTn id="40" presetID="4" presetClass="entr" presetSubtype="16" fill="hold" grpId="0" nodeType="clickEffect">
                                   <p:stCondLst>
                                     <p:cond delay="0"/>
                                   </p:stCondLst>
                                   <p:childTnLst>
                                     <p:set>
                                       <p:cBhvr>
-                                        <p:cTn id="43" dur="1" fill="hold">
+                                        <p:cTn id="41" dur="1" fill="hold">
                                           <p:stCondLst>
                                             <p:cond delay="0"/>
                                           </p:stCondLst>
@@ -19642,7 +19685,7 @@
                                     </p:set>
                                     <p:animEffect transition="in" filter="box(in)">
                                       <p:cBhvr>
-                                        <p:cTn id="44" dur="500"/>
+                                        <p:cTn id="42" dur="500"/>
                                         <p:tgtEl>
                                           <p:spTgt spid="32"/>
                                         </p:tgtEl>
@@ -19652,14 +19695,14 @@
                                 </p:cTn>
                               </p:par>
                               <p:par>
-                                <p:cTn id="45" presetID="4" presetClass="entr" presetSubtype="16" fill="hold" grpId="0" nodeType="withEffect">
+                                <p:cTn id="43" presetID="4" presetClass="entr" presetSubtype="16" fill="hold" grpId="0" nodeType="withEffect">
                                   <p:stCondLst>
                                     <p:cond delay="0"/>
                                   </p:stCondLst>
                                   <p:childTnLst>
                                     <p:set>
                                       <p:cBhvr>
-                                        <p:cTn id="46" dur="1" fill="hold">
+                                        <p:cTn id="44" dur="1" fill="hold">
                                           <p:stCondLst>
                                             <p:cond delay="0"/>
                                           </p:stCondLst>
@@ -19677,7 +19720,7 @@
                                     </p:set>
                                     <p:animEffect transition="in" filter="box(in)">
                                       <p:cBhvr>
-                                        <p:cTn id="47" dur="500"/>
+                                        <p:cTn id="45" dur="500"/>
                                         <p:tgtEl>
                                           <p:spTgt spid="28"/>
                                         </p:tgtEl>
@@ -19686,33 +19729,15 @@
                                   </p:childTnLst>
                                 </p:cTn>
                               </p:par>
-                            </p:childTnLst>
-                          </p:cTn>
-                        </p:par>
-                      </p:childTnLst>
-                    </p:cTn>
-                  </p:par>
-                  <p:par>
-                    <p:cTn id="48" fill="hold">
-                      <p:stCondLst>
-                        <p:cond delay="indefinite"/>
-                      </p:stCondLst>
-                      <p:childTnLst>
-                        <p:par>
-                          <p:cTn id="49" fill="hold">
-                            <p:stCondLst>
-                              <p:cond delay="0"/>
-                            </p:stCondLst>
-                            <p:childTnLst>
                               <p:par>
-                                <p:cTn id="50" presetID="4" presetClass="entr" presetSubtype="16" fill="hold" grpId="0" nodeType="clickEffect">
+                                <p:cTn id="46" presetID="4" presetClass="entr" presetSubtype="16" fill="hold" grpId="0" nodeType="withEffect">
                                   <p:stCondLst>
                                     <p:cond delay="0"/>
                                   </p:stCondLst>
                                   <p:childTnLst>
                                     <p:set>
                                       <p:cBhvr>
-                                        <p:cTn id="51" dur="1" fill="hold">
+                                        <p:cTn id="47" dur="1" fill="hold">
                                           <p:stCondLst>
                                             <p:cond delay="0"/>
                                           </p:stCondLst>
@@ -19730,7 +19755,7 @@
                                     </p:set>
                                     <p:animEffect transition="in" filter="box(in)">
                                       <p:cBhvr>
-                                        <p:cTn id="52" dur="500"/>
+                                        <p:cTn id="48" dur="500"/>
                                         <p:tgtEl>
                                           <p:spTgt spid="25"/>
                                         </p:tgtEl>
@@ -19740,14 +19765,14 @@
                                 </p:cTn>
                               </p:par>
                               <p:par>
-                                <p:cTn id="53" presetID="4" presetClass="entr" presetSubtype="16" fill="hold" grpId="0" nodeType="withEffect">
+                                <p:cTn id="49" presetID="4" presetClass="entr" presetSubtype="16" fill="hold" grpId="0" nodeType="withEffect">
                                   <p:stCondLst>
                                     <p:cond delay="0"/>
                                   </p:stCondLst>
                                   <p:childTnLst>
                                     <p:set>
                                       <p:cBhvr>
-                                        <p:cTn id="54" dur="1" fill="hold">
+                                        <p:cTn id="50" dur="1" fill="hold">
                                           <p:stCondLst>
                                             <p:cond delay="0"/>
                                           </p:stCondLst>
@@ -19765,7 +19790,7 @@
                                     </p:set>
                                     <p:animEffect transition="in" filter="box(in)">
                                       <p:cBhvr>
-                                        <p:cTn id="55" dur="500"/>
+                                        <p:cTn id="51" dur="500"/>
                                         <p:tgtEl>
                                           <p:spTgt spid="36"/>
                                         </p:tgtEl>
@@ -21057,6 +21082,41 @@
                                   </p:childTnLst>
                                 </p:cTn>
                               </p:par>
+                              <p:par>
+                                <p:cTn id="45" presetID="10" presetClass="entr" presetSubtype="0" fill="hold" grpId="0" nodeType="withEffect">
+                                  <p:stCondLst>
+                                    <p:cond delay="0"/>
+                                  </p:stCondLst>
+                                  <p:childTnLst>
+                                    <p:set>
+                                      <p:cBhvr>
+                                        <p:cTn id="46" dur="1" fill="hold">
+                                          <p:stCondLst>
+                                            <p:cond delay="0"/>
+                                          </p:stCondLst>
+                                        </p:cTn>
+                                        <p:tgtEl>
+                                          <p:spTgt spid="28"/>
+                                        </p:tgtEl>
+                                        <p:attrNameLst>
+                                          <p:attrName>style.visibility</p:attrName>
+                                        </p:attrNameLst>
+                                      </p:cBhvr>
+                                      <p:to>
+                                        <p:strVal val="visible"/>
+                                      </p:to>
+                                    </p:set>
+                                    <p:animEffect transition="in" filter="fade">
+                                      <p:cBhvr>
+                                        <p:cTn id="47" dur="500"/>
+                                        <p:tgtEl>
+                                          <p:spTgt spid="28"/>
+                                        </p:tgtEl>
+                                      </p:cBhvr>
+                                    </p:animEffect>
+                                  </p:childTnLst>
+                                </p:cTn>
+                              </p:par>
                             </p:childTnLst>
                           </p:cTn>
                         </p:par>
@@ -21064,54 +21124,19 @@
                     </p:cTn>
                   </p:par>
                   <p:par>
-                    <p:cTn id="45" fill="hold">
+                    <p:cTn id="48" fill="hold">
                       <p:stCondLst>
                         <p:cond delay="indefinite"/>
                       </p:stCondLst>
                       <p:childTnLst>
                         <p:par>
-                          <p:cTn id="46" fill="hold">
+                          <p:cTn id="49" fill="hold">
                             <p:stCondLst>
                               <p:cond delay="0"/>
                             </p:stCondLst>
                             <p:childTnLst>
                               <p:par>
-                                <p:cTn id="47" presetID="10" presetClass="entr" presetSubtype="0" fill="hold" grpId="0" nodeType="clickEffect">
-                                  <p:stCondLst>
-                                    <p:cond delay="0"/>
-                                  </p:stCondLst>
-                                  <p:childTnLst>
-                                    <p:set>
-                                      <p:cBhvr>
-                                        <p:cTn id="48" dur="1" fill="hold">
-                                          <p:stCondLst>
-                                            <p:cond delay="0"/>
-                                          </p:stCondLst>
-                                        </p:cTn>
-                                        <p:tgtEl>
-                                          <p:spTgt spid="33"/>
-                                        </p:tgtEl>
-                                        <p:attrNameLst>
-                                          <p:attrName>style.visibility</p:attrName>
-                                        </p:attrNameLst>
-                                      </p:cBhvr>
-                                      <p:to>
-                                        <p:strVal val="visible"/>
-                                      </p:to>
-                                    </p:set>
-                                    <p:animEffect transition="in" filter="fade">
-                                      <p:cBhvr>
-                                        <p:cTn id="49" dur="500"/>
-                                        <p:tgtEl>
-                                          <p:spTgt spid="33"/>
-                                        </p:tgtEl>
-                                      </p:cBhvr>
-                                    </p:animEffect>
-                                  </p:childTnLst>
-                                </p:cTn>
-                              </p:par>
-                              <p:par>
-                                <p:cTn id="50" presetID="10" presetClass="entr" presetSubtype="0" fill="hold" grpId="0" nodeType="withEffect">
+                                <p:cTn id="50" presetID="10" presetClass="entr" presetSubtype="0" fill="hold" grpId="0" nodeType="clickEffect">
                                   <p:stCondLst>
                                     <p:cond delay="0"/>
                                   </p:stCondLst>
@@ -21124,7 +21149,7 @@
                                           </p:stCondLst>
                                         </p:cTn>
                                         <p:tgtEl>
-                                          <p:spTgt spid="30"/>
+                                          <p:spTgt spid="33"/>
                                         </p:tgtEl>
                                         <p:attrNameLst>
                                           <p:attrName>style.visibility</p:attrName>
@@ -21138,7 +21163,7 @@
                                       <p:cBhvr>
                                         <p:cTn id="52" dur="500"/>
                                         <p:tgtEl>
-                                          <p:spTgt spid="30"/>
+                                          <p:spTgt spid="33"/>
                                         </p:tgtEl>
                                       </p:cBhvr>
                                     </p:animEffect>
@@ -21159,7 +21184,7 @@
                                           </p:stCondLst>
                                         </p:cTn>
                                         <p:tgtEl>
-                                          <p:spTgt spid="28"/>
+                                          <p:spTgt spid="30"/>
                                         </p:tgtEl>
                                         <p:attrNameLst>
                                           <p:attrName>style.visibility</p:attrName>
@@ -21173,7 +21198,7 @@
                                       <p:cBhvr>
                                         <p:cTn id="55" dur="500"/>
                                         <p:tgtEl>
-                                          <p:spTgt spid="28"/>
+                                          <p:spTgt spid="30"/>
                                         </p:tgtEl>
                                       </p:cBhvr>
                                     </p:animEffect>

</xml_diff>